<commit_message>
sample with type examination
</commit_message>
<xml_diff>
--- a/figures/draw_figures.pptx
+++ b/figures/draw_figures.pptx
@@ -6,6 +6,7 @@
   </p:sldMasterIdLst>
   <p:sldIdLst>
     <p:sldId id="256" r:id="rId2"/>
+    <p:sldId id="257" r:id="rId3"/>
   </p:sldIdLst>
   <p:sldSz cx="23760113" cy="14400213"/>
   <p:notesSz cx="6858000" cy="9144000"/>
@@ -104,6 +105,11 @@
       </a:defRPr>
     </a:lvl9pPr>
   </p:defaultTextStyle>
+  <p:extLst>
+    <p:ext uri="{EFAFB233-063F-42B5-8137-9DF3F51BA10A}">
+      <p15:sldGuideLst xmlns:p15="http://schemas.microsoft.com/office/powerpoint/2012/main"/>
+    </p:ext>
+  </p:extLst>
 </p:presentation>
 </file>
 
@@ -238,7 +244,7 @@
           <a:p>
             <a:fld id="{A8C8C33B-2EE2-9247-B36D-BA006F068735}" type="datetimeFigureOut">
               <a:rPr kumimoji="1" lang="zh-CN" altLang="en-US" smtClean="0"/>
-              <a:t>2021/8/20</a:t>
+              <a:t>2021/8/25</a:t>
             </a:fld>
             <a:endParaRPr kumimoji="1" lang="zh-CN" altLang="en-US"/>
           </a:p>
@@ -408,7 +414,7 @@
           <a:p>
             <a:fld id="{A8C8C33B-2EE2-9247-B36D-BA006F068735}" type="datetimeFigureOut">
               <a:rPr kumimoji="1" lang="zh-CN" altLang="en-US" smtClean="0"/>
-              <a:t>2021/8/20</a:t>
+              <a:t>2021/8/25</a:t>
             </a:fld>
             <a:endParaRPr kumimoji="1" lang="zh-CN" altLang="en-US"/>
           </a:p>
@@ -588,7 +594,7 @@
           <a:p>
             <a:fld id="{A8C8C33B-2EE2-9247-B36D-BA006F068735}" type="datetimeFigureOut">
               <a:rPr kumimoji="1" lang="zh-CN" altLang="en-US" smtClean="0"/>
-              <a:t>2021/8/20</a:t>
+              <a:t>2021/8/25</a:t>
             </a:fld>
             <a:endParaRPr kumimoji="1" lang="zh-CN" altLang="en-US"/>
           </a:p>
@@ -758,7 +764,7 @@
           <a:p>
             <a:fld id="{A8C8C33B-2EE2-9247-B36D-BA006F068735}" type="datetimeFigureOut">
               <a:rPr kumimoji="1" lang="zh-CN" altLang="en-US" smtClean="0"/>
-              <a:t>2021/8/20</a:t>
+              <a:t>2021/8/25</a:t>
             </a:fld>
             <a:endParaRPr kumimoji="1" lang="zh-CN" altLang="en-US"/>
           </a:p>
@@ -1004,7 +1010,7 @@
           <a:p>
             <a:fld id="{A8C8C33B-2EE2-9247-B36D-BA006F068735}" type="datetimeFigureOut">
               <a:rPr kumimoji="1" lang="zh-CN" altLang="en-US" smtClean="0"/>
-              <a:t>2021/8/20</a:t>
+              <a:t>2021/8/25</a:t>
             </a:fld>
             <a:endParaRPr kumimoji="1" lang="zh-CN" altLang="en-US"/>
           </a:p>
@@ -1236,7 +1242,7 @@
           <a:p>
             <a:fld id="{A8C8C33B-2EE2-9247-B36D-BA006F068735}" type="datetimeFigureOut">
               <a:rPr kumimoji="1" lang="zh-CN" altLang="en-US" smtClean="0"/>
-              <a:t>2021/8/20</a:t>
+              <a:t>2021/8/25</a:t>
             </a:fld>
             <a:endParaRPr kumimoji="1" lang="zh-CN" altLang="en-US"/>
           </a:p>
@@ -1603,7 +1609,7 @@
           <a:p>
             <a:fld id="{A8C8C33B-2EE2-9247-B36D-BA006F068735}" type="datetimeFigureOut">
               <a:rPr kumimoji="1" lang="zh-CN" altLang="en-US" smtClean="0"/>
-              <a:t>2021/8/20</a:t>
+              <a:t>2021/8/25</a:t>
             </a:fld>
             <a:endParaRPr kumimoji="1" lang="zh-CN" altLang="en-US"/>
           </a:p>
@@ -1721,7 +1727,7 @@
           <a:p>
             <a:fld id="{A8C8C33B-2EE2-9247-B36D-BA006F068735}" type="datetimeFigureOut">
               <a:rPr kumimoji="1" lang="zh-CN" altLang="en-US" smtClean="0"/>
-              <a:t>2021/8/20</a:t>
+              <a:t>2021/8/25</a:t>
             </a:fld>
             <a:endParaRPr kumimoji="1" lang="zh-CN" altLang="en-US"/>
           </a:p>
@@ -1816,7 +1822,7 @@
           <a:p>
             <a:fld id="{A8C8C33B-2EE2-9247-B36D-BA006F068735}" type="datetimeFigureOut">
               <a:rPr kumimoji="1" lang="zh-CN" altLang="en-US" smtClean="0"/>
-              <a:t>2021/8/20</a:t>
+              <a:t>2021/8/25</a:t>
             </a:fld>
             <a:endParaRPr kumimoji="1" lang="zh-CN" altLang="en-US"/>
           </a:p>
@@ -2093,7 +2099,7 @@
           <a:p>
             <a:fld id="{A8C8C33B-2EE2-9247-B36D-BA006F068735}" type="datetimeFigureOut">
               <a:rPr kumimoji="1" lang="zh-CN" altLang="en-US" smtClean="0"/>
-              <a:t>2021/8/20</a:t>
+              <a:t>2021/8/25</a:t>
             </a:fld>
             <a:endParaRPr kumimoji="1" lang="zh-CN" altLang="en-US"/>
           </a:p>
@@ -2350,7 +2356,7 @@
           <a:p>
             <a:fld id="{A8C8C33B-2EE2-9247-B36D-BA006F068735}" type="datetimeFigureOut">
               <a:rPr kumimoji="1" lang="zh-CN" altLang="en-US" smtClean="0"/>
-              <a:t>2021/8/20</a:t>
+              <a:t>2021/8/25</a:t>
             </a:fld>
             <a:endParaRPr kumimoji="1" lang="zh-CN" altLang="en-US"/>
           </a:p>
@@ -2563,7 +2569,7 @@
           <a:p>
             <a:fld id="{A8C8C33B-2EE2-9247-B36D-BA006F068735}" type="datetimeFigureOut">
               <a:rPr kumimoji="1" lang="zh-CN" altLang="en-US" smtClean="0"/>
-              <a:t>2021/8/20</a:t>
+              <a:t>2021/8/25</a:t>
             </a:fld>
             <a:endParaRPr kumimoji="1" lang="zh-CN" altLang="en-US"/>
           </a:p>
@@ -6066,6 +6072,2452 @@
 </p:sld>
 </file>
 
+<file path=ppt/slides/slide2.xml><?xml version="1.0" encoding="utf-8"?>
+<p:sld xmlns:a="http://schemas.openxmlformats.org/drawingml/2006/main" xmlns:r="http://schemas.openxmlformats.org/officeDocument/2006/relationships" xmlns:p="http://schemas.openxmlformats.org/presentationml/2006/main">
+  <p:cSld>
+    <p:spTree>
+      <p:nvGrpSpPr>
+        <p:cNvPr id="1" name=""/>
+        <p:cNvGrpSpPr/>
+        <p:nvPr/>
+      </p:nvGrpSpPr>
+      <p:grpSpPr>
+        <a:xfrm>
+          <a:off x="0" y="0"/>
+          <a:ext cx="0" cy="0"/>
+          <a:chOff x="0" y="0"/>
+          <a:chExt cx="0" cy="0"/>
+        </a:xfrm>
+      </p:grpSpPr>
+      <p:sp>
+        <p:nvSpPr>
+          <p:cNvPr id="2" name="文本框 1">
+            <a:extLst>
+              <a:ext uri="{FF2B5EF4-FFF2-40B4-BE49-F238E27FC236}">
+                <a16:creationId xmlns:a16="http://schemas.microsoft.com/office/drawing/2014/main" id="{7AB0FAE8-383B-944E-83A9-DC069EC775B1}"/>
+              </a:ext>
+            </a:extLst>
+          </p:cNvPr>
+          <p:cNvSpPr txBox="1"/>
+          <p:nvPr/>
+        </p:nvSpPr>
+        <p:spPr>
+          <a:xfrm>
+            <a:off x="2305311" y="1280526"/>
+            <a:ext cx="14132010" cy="369332"/>
+          </a:xfrm>
+          <a:prstGeom prst="rect">
+            <a:avLst/>
+          </a:prstGeom>
+          <a:ln/>
+        </p:spPr>
+        <p:style>
+          <a:lnRef idx="1">
+            <a:schemeClr val="accent6"/>
+          </a:lnRef>
+          <a:fillRef idx="2">
+            <a:schemeClr val="accent6"/>
+          </a:fillRef>
+          <a:effectRef idx="1">
+            <a:schemeClr val="accent6"/>
+          </a:effectRef>
+          <a:fontRef idx="minor">
+            <a:schemeClr val="dk1"/>
+          </a:fontRef>
+        </p:style>
+        <p:txBody>
+          <a:bodyPr wrap="none" rtlCol="0">
+            <a:spAutoFit/>
+          </a:bodyPr>
+          <a:lstStyle/>
+          <a:p>
+            <a:r>
+              <a:rPr kumimoji="1" lang="en-US" altLang="zh-CN" u="sng" dirty="0"/>
+              <a:t>Natural Language:</a:t>
+            </a:r>
+            <a:r>
+              <a:rPr kumimoji="1" lang="en-US" altLang="zh-CN" dirty="0"/>
+              <a:t> 		</a:t>
+            </a:r>
+            <a:r>
+              <a:rPr kumimoji="1" lang="en-US" altLang="zh-CN" dirty="0">
+                <a:latin typeface="Chalkboard" panose="03050602040202020205" pitchFamily="66" charset="0"/>
+              </a:rPr>
+              <a:t>Find a movie about love or a movie starred by the actor who has won the Oscar but not the golden globe.</a:t>
+            </a:r>
+            <a:endParaRPr kumimoji="1" lang="zh-CN" altLang="en-US" dirty="0">
+              <a:latin typeface="Chalkboard" panose="03050602040202020205" pitchFamily="66" charset="0"/>
+            </a:endParaRPr>
+          </a:p>
+        </p:txBody>
+      </p:sp>
+      <mc:AlternateContent xmlns:mc="http://schemas.openxmlformats.org/markup-compatibility/2006">
+        <mc:Choice xmlns:a14="http://schemas.microsoft.com/office/drawing/2010/main" Requires="a14">
+          <p:sp>
+            <p:nvSpPr>
+              <p:cNvPr id="3" name="文本框 2">
+                <a:extLst>
+                  <a:ext uri="{FF2B5EF4-FFF2-40B4-BE49-F238E27FC236}">
+                    <a16:creationId xmlns:a16="http://schemas.microsoft.com/office/drawing/2014/main" id="{1FB05416-19A8-8542-AC6F-7C527D165A37}"/>
+                  </a:ext>
+                </a:extLst>
+              </p:cNvPr>
+              <p:cNvSpPr txBox="1"/>
+              <p:nvPr/>
+            </p:nvSpPr>
+            <p:spPr>
+              <a:xfrm>
+                <a:off x="2305311" y="1766170"/>
+                <a:ext cx="11266418" cy="369332"/>
+              </a:xfrm>
+              <a:prstGeom prst="rect">
+                <a:avLst/>
+              </a:prstGeom>
+              <a:ln/>
+            </p:spPr>
+            <p:style>
+              <a:lnRef idx="1">
+                <a:schemeClr val="accent5"/>
+              </a:lnRef>
+              <a:fillRef idx="2">
+                <a:schemeClr val="accent5"/>
+              </a:fillRef>
+              <a:effectRef idx="1">
+                <a:schemeClr val="accent5"/>
+              </a:effectRef>
+              <a:fontRef idx="minor">
+                <a:schemeClr val="dk1"/>
+              </a:fontRef>
+            </p:style>
+            <p:txBody>
+              <a:bodyPr wrap="none" rtlCol="0">
+                <a:spAutoFit/>
+              </a:bodyPr>
+              <a:lstStyle/>
+              <a:p>
+                <a:r>
+                  <a:rPr kumimoji="1" lang="en-US" altLang="zh-CN" u="sng" dirty="0"/>
+                  <a:t>Logical Formula:</a:t>
+                </a:r>
+                <a:r>
+                  <a:rPr kumimoji="1" lang="zh-CN" altLang="en-US" dirty="0"/>
+                  <a:t> </a:t>
+                </a:r>
+                <a:r>
+                  <a:rPr kumimoji="1" lang="en-US" altLang="zh-CN" dirty="0"/>
+                  <a:t>		 </a:t>
+                </a:r>
+                <a14:m>
+                  <m:oMath xmlns:m="http://schemas.openxmlformats.org/officeDocument/2006/math">
+                    <m:r>
+                      <a:rPr kumimoji="1" lang="en-US" altLang="zh-CN" b="0" i="1" smtClean="0">
+                        <a:latin typeface="Cambria Math" panose="02040503050406030204" pitchFamily="18" charset="0"/>
+                      </a:rPr>
+                      <m:t>?</m:t>
+                    </m:r>
+                    <m:r>
+                      <a:rPr kumimoji="1" lang="en-US" altLang="zh-CN" b="0" i="1" smtClean="0">
+                        <a:latin typeface="Cambria Math" panose="02040503050406030204" pitchFamily="18" charset="0"/>
+                        <a:ea typeface="Cambria Math" panose="02040503050406030204" pitchFamily="18" charset="0"/>
+                      </a:rPr>
+                      <m:t>𝛼</m:t>
+                    </m:r>
+                    <m:r>
+                      <a:rPr kumimoji="1" lang="en-US" altLang="zh-CN" b="0" i="1" smtClean="0">
+                        <a:latin typeface="Cambria Math" panose="02040503050406030204" pitchFamily="18" charset="0"/>
+                        <a:ea typeface="Cambria Math" panose="02040503050406030204" pitchFamily="18" charset="0"/>
+                      </a:rPr>
+                      <m:t>∃</m:t>
+                    </m:r>
+                    <m:r>
+                      <a:rPr kumimoji="1" lang="en-US" altLang="zh-CN" b="0" i="1" smtClean="0">
+                        <a:latin typeface="Cambria Math" panose="02040503050406030204" pitchFamily="18" charset="0"/>
+                        <a:ea typeface="Cambria Math" panose="02040503050406030204" pitchFamily="18" charset="0"/>
+                      </a:rPr>
+                      <m:t>𝛽</m:t>
+                    </m:r>
+                    <m:r>
+                      <a:rPr kumimoji="1" lang="en-US" altLang="zh-CN" b="0" i="1" smtClean="0">
+                        <a:latin typeface="Cambria Math" panose="02040503050406030204" pitchFamily="18" charset="0"/>
+                        <a:ea typeface="Cambria Math" panose="02040503050406030204" pitchFamily="18" charset="0"/>
+                      </a:rPr>
+                      <m:t>.</m:t>
+                    </m:r>
+                  </m:oMath>
+                </a14:m>
+                <a:r>
+                  <a:rPr kumimoji="1" lang="en-US" altLang="zh-CN" dirty="0">
+                    <a:latin typeface="Chalkboard" panose="03050602040202020205" pitchFamily="66" charset="0"/>
+                  </a:rPr>
+                  <a:t> </a:t>
+                </a:r>
+                <a:r>
+                  <a:rPr kumimoji="1" lang="en-US" altLang="zh-CN" dirty="0" err="1">
+                    <a:latin typeface="Chalkboard" panose="03050602040202020205" pitchFamily="66" charset="0"/>
+                  </a:rPr>
+                  <a:t>IsAbout</a:t>
+                </a:r>
+                <a:r>
+                  <a:rPr kumimoji="1" lang="en-US" altLang="zh-CN" dirty="0">
+                    <a:latin typeface="Chalkboard" panose="03050602040202020205" pitchFamily="66" charset="0"/>
+                  </a:rPr>
+                  <a:t>(</a:t>
+                </a:r>
+                <a14:m>
+                  <m:oMath xmlns:m="http://schemas.openxmlformats.org/officeDocument/2006/math">
+                    <m:r>
+                      <a:rPr kumimoji="1" lang="en-US" altLang="zh-CN" i="1">
+                        <a:latin typeface="Cambria Math" panose="02040503050406030204" pitchFamily="18" charset="0"/>
+                        <a:ea typeface="Cambria Math" panose="02040503050406030204" pitchFamily="18" charset="0"/>
+                      </a:rPr>
+                      <m:t>𝛼</m:t>
+                    </m:r>
+                  </m:oMath>
+                </a14:m>
+                <a:r>
+                  <a:rPr kumimoji="1" lang="en-US" altLang="zh-CN" dirty="0">
+                    <a:latin typeface="Chalkboard" panose="03050602040202020205" pitchFamily="66" charset="0"/>
+                  </a:rPr>
+                  <a:t>, Love)</a:t>
+                </a:r>
+                <a14:m>
+                  <m:oMath xmlns:m="http://schemas.openxmlformats.org/officeDocument/2006/math">
+                    <m:r>
+                      <a:rPr kumimoji="1" lang="en-US" altLang="zh-CN" b="0" i="0" smtClean="0">
+                        <a:latin typeface="Cambria Math" panose="02040503050406030204" pitchFamily="18" charset="0"/>
+                        <a:ea typeface="Cambria Math" panose="02040503050406030204" pitchFamily="18" charset="0"/>
+                      </a:rPr>
+                      <m:t> </m:t>
+                    </m:r>
+                    <m:r>
+                      <a:rPr kumimoji="1" lang="en-US" altLang="zh-CN" i="1" smtClean="0">
+                        <a:latin typeface="Cambria Math" panose="02040503050406030204" pitchFamily="18" charset="0"/>
+                        <a:ea typeface="Cambria Math" panose="02040503050406030204" pitchFamily="18" charset="0"/>
+                      </a:rPr>
+                      <m:t>∨</m:t>
+                    </m:r>
+                  </m:oMath>
+                </a14:m>
+                <a:r>
+                  <a:rPr kumimoji="1" lang="en-US" altLang="zh-CN" dirty="0">
+                    <a:latin typeface="Chalkboard" panose="03050602040202020205" pitchFamily="66" charset="0"/>
+                  </a:rPr>
+                  <a:t> [HasActor(</a:t>
+                </a:r>
+                <a14:m>
+                  <m:oMath xmlns:m="http://schemas.openxmlformats.org/officeDocument/2006/math">
+                    <m:r>
+                      <a:rPr kumimoji="1" lang="en-US" altLang="zh-CN" i="1" smtClean="0">
+                        <a:latin typeface="Cambria Math" panose="02040503050406030204" pitchFamily="18" charset="0"/>
+                        <a:ea typeface="Cambria Math" panose="02040503050406030204" pitchFamily="18" charset="0"/>
+                      </a:rPr>
+                      <m:t>𝛼</m:t>
+                    </m:r>
+                  </m:oMath>
+                </a14:m>
+                <a:r>
+                  <a:rPr kumimoji="1" lang="en-US" altLang="zh-CN" dirty="0">
+                    <a:latin typeface="Chalkboard" panose="03050602040202020205" pitchFamily="66" charset="0"/>
+                  </a:rPr>
+                  <a:t>,</a:t>
+                </a:r>
+                <a:r>
+                  <a:rPr kumimoji="1" lang="en-US" altLang="zh-CN" dirty="0">
+                    <a:ea typeface="Cambria Math" panose="02040503050406030204" pitchFamily="18" charset="0"/>
+                  </a:rPr>
+                  <a:t> </a:t>
+                </a:r>
+                <a14:m>
+                  <m:oMath xmlns:m="http://schemas.openxmlformats.org/officeDocument/2006/math">
+                    <m:r>
+                      <a:rPr kumimoji="1" lang="en-US" altLang="zh-CN" i="1" smtClean="0">
+                        <a:latin typeface="Cambria Math" panose="02040503050406030204" pitchFamily="18" charset="0"/>
+                        <a:ea typeface="Cambria Math" panose="02040503050406030204" pitchFamily="18" charset="0"/>
+                      </a:rPr>
+                      <m:t>𝛽</m:t>
+                    </m:r>
+                  </m:oMath>
+                </a14:m>
+                <a:r>
+                  <a:rPr kumimoji="1" lang="en-US" altLang="zh-CN" dirty="0">
+                    <a:latin typeface="Chalkboard" panose="03050602040202020205" pitchFamily="66" charset="0"/>
+                  </a:rPr>
+                  <a:t>)</a:t>
+                </a:r>
+                <a:r>
+                  <a:rPr kumimoji="1" lang="en-US" altLang="zh-CN" dirty="0">
+                    <a:ea typeface="Cambria Math" panose="02040503050406030204" pitchFamily="18" charset="0"/>
+                  </a:rPr>
+                  <a:t> </a:t>
+                </a:r>
+                <a14:m>
+                  <m:oMath xmlns:m="http://schemas.openxmlformats.org/officeDocument/2006/math">
+                    <m:r>
+                      <a:rPr kumimoji="1" lang="en-US" altLang="zh-CN" i="1" smtClean="0">
+                        <a:latin typeface="Cambria Math" panose="02040503050406030204" pitchFamily="18" charset="0"/>
+                        <a:ea typeface="Cambria Math" panose="02040503050406030204" pitchFamily="18" charset="0"/>
+                      </a:rPr>
+                      <m:t>∧</m:t>
+                    </m:r>
+                  </m:oMath>
+                </a14:m>
+                <a:r>
+                  <a:rPr kumimoji="1" lang="en-US" altLang="zh-CN" dirty="0">
+                    <a:latin typeface="Chalkboard" panose="03050602040202020205" pitchFamily="66" charset="0"/>
+                  </a:rPr>
+                  <a:t> Won(</a:t>
+                </a:r>
+                <a14:m>
+                  <m:oMath xmlns:m="http://schemas.openxmlformats.org/officeDocument/2006/math">
+                    <m:r>
+                      <a:rPr kumimoji="1" lang="en-US" altLang="zh-CN" i="1">
+                        <a:latin typeface="Cambria Math" panose="02040503050406030204" pitchFamily="18" charset="0"/>
+                        <a:ea typeface="Cambria Math" panose="02040503050406030204" pitchFamily="18" charset="0"/>
+                      </a:rPr>
+                      <m:t>𝛽</m:t>
+                    </m:r>
+                  </m:oMath>
+                </a14:m>
+                <a:r>
+                  <a:rPr kumimoji="1" lang="en-US" altLang="zh-CN" dirty="0">
+                    <a:latin typeface="Chalkboard" panose="03050602040202020205" pitchFamily="66" charset="0"/>
+                  </a:rPr>
+                  <a:t>, Oscar)</a:t>
+                </a:r>
+                <a:r>
+                  <a:rPr kumimoji="1" lang="en-US" altLang="zh-CN" dirty="0">
+                    <a:ea typeface="Cambria Math" panose="02040503050406030204" pitchFamily="18" charset="0"/>
+                  </a:rPr>
+                  <a:t> </a:t>
+                </a:r>
+                <a14:m>
+                  <m:oMath xmlns:m="http://schemas.openxmlformats.org/officeDocument/2006/math">
+                    <m:r>
+                      <a:rPr kumimoji="1" lang="en-US" altLang="zh-CN" i="1">
+                        <a:latin typeface="Cambria Math" panose="02040503050406030204" pitchFamily="18" charset="0"/>
+                        <a:ea typeface="Cambria Math" panose="02040503050406030204" pitchFamily="18" charset="0"/>
+                      </a:rPr>
+                      <m:t>∧</m:t>
+                    </m:r>
+                    <m:r>
+                      <a:rPr kumimoji="1" lang="en-US" altLang="zh-CN" i="1" smtClean="0">
+                        <a:latin typeface="Cambria Math" panose="02040503050406030204" pitchFamily="18" charset="0"/>
+                        <a:ea typeface="Cambria Math" panose="02040503050406030204" pitchFamily="18" charset="0"/>
+                      </a:rPr>
+                      <m:t>¬</m:t>
+                    </m:r>
+                  </m:oMath>
+                </a14:m>
+                <a:r>
+                  <a:rPr kumimoji="1" lang="en-US" altLang="zh-CN" dirty="0">
+                    <a:latin typeface="Chalkboard" panose="03050602040202020205" pitchFamily="66" charset="0"/>
+                  </a:rPr>
+                  <a:t> Won(</a:t>
+                </a:r>
+                <a14:m>
+                  <m:oMath xmlns:m="http://schemas.openxmlformats.org/officeDocument/2006/math">
+                    <m:r>
+                      <a:rPr kumimoji="1" lang="en-US" altLang="zh-CN" i="1">
+                        <a:latin typeface="Cambria Math" panose="02040503050406030204" pitchFamily="18" charset="0"/>
+                        <a:ea typeface="Cambria Math" panose="02040503050406030204" pitchFamily="18" charset="0"/>
+                      </a:rPr>
+                      <m:t>𝛽</m:t>
+                    </m:r>
+                  </m:oMath>
+                </a14:m>
+                <a:r>
+                  <a:rPr kumimoji="1" lang="en-US" altLang="zh-CN" dirty="0">
+                    <a:latin typeface="Chalkboard" panose="03050602040202020205" pitchFamily="66" charset="0"/>
+                  </a:rPr>
+                  <a:t>, Golden globe)]</a:t>
+                </a:r>
+                <a:endParaRPr kumimoji="1" lang="zh-CN" altLang="en-US" dirty="0">
+                  <a:latin typeface="Chalkboard" panose="03050602040202020205" pitchFamily="66" charset="0"/>
+                </a:endParaRPr>
+              </a:p>
+            </p:txBody>
+          </p:sp>
+        </mc:Choice>
+        <mc:Fallback>
+          <p:sp>
+            <p:nvSpPr>
+              <p:cNvPr id="3" name="文本框 2">
+                <a:extLst>
+                  <a:ext uri="{FF2B5EF4-FFF2-40B4-BE49-F238E27FC236}">
+                    <a16:creationId xmlns:a16="http://schemas.microsoft.com/office/drawing/2014/main" id="{1FB05416-19A8-8542-AC6F-7C527D165A37}"/>
+                  </a:ext>
+                </a:extLst>
+              </p:cNvPr>
+              <p:cNvSpPr txBox="1">
+                <a:spLocks noRot="1" noChangeAspect="1" noMove="1" noResize="1" noEditPoints="1" noAdjustHandles="1" noChangeArrowheads="1" noChangeShapeType="1" noTextEdit="1"/>
+              </p:cNvSpPr>
+              <p:nvPr/>
+            </p:nvSpPr>
+            <p:spPr>
+              <a:xfrm>
+                <a:off x="2305311" y="1766170"/>
+                <a:ext cx="11266418" cy="369332"/>
+              </a:xfrm>
+              <a:prstGeom prst="rect">
+                <a:avLst/>
+              </a:prstGeom>
+              <a:blipFill>
+                <a:blip r:embed="rId2"/>
+                <a:stretch>
+                  <a:fillRect l="-450" t="-10000" b="-23333"/>
+                </a:stretch>
+              </a:blipFill>
+              <a:ln/>
+            </p:spPr>
+            <p:txBody>
+              <a:bodyPr/>
+              <a:lstStyle/>
+              <a:p>
+                <a:r>
+                  <a:rPr lang="zh-CN" altLang="en-US">
+                    <a:noFill/>
+                  </a:rPr>
+                  <a:t> </a:t>
+                </a:r>
+              </a:p>
+            </p:txBody>
+          </p:sp>
+        </mc:Fallback>
+      </mc:AlternateContent>
+      <mc:AlternateContent xmlns:mc="http://schemas.openxmlformats.org/markup-compatibility/2006">
+        <mc:Choice xmlns:a14="http://schemas.microsoft.com/office/drawing/2010/main" Requires="a14">
+          <p:sp>
+            <p:nvSpPr>
+              <p:cNvPr id="4" name="文本框 3">
+                <a:extLst>
+                  <a:ext uri="{FF2B5EF4-FFF2-40B4-BE49-F238E27FC236}">
+                    <a16:creationId xmlns:a16="http://schemas.microsoft.com/office/drawing/2014/main" id="{ED9AEDC1-478A-4249-A5D3-6FD911EE7F65}"/>
+                  </a:ext>
+                </a:extLst>
+              </p:cNvPr>
+              <p:cNvSpPr txBox="1"/>
+              <p:nvPr/>
+            </p:nvSpPr>
+            <p:spPr>
+              <a:xfrm>
+                <a:off x="2305311" y="2251814"/>
+                <a:ext cx="11508663" cy="369332"/>
+              </a:xfrm>
+              <a:prstGeom prst="rect">
+                <a:avLst/>
+              </a:prstGeom>
+              <a:ln/>
+            </p:spPr>
+            <p:style>
+              <a:lnRef idx="1">
+                <a:schemeClr val="accent2"/>
+              </a:lnRef>
+              <a:fillRef idx="2">
+                <a:schemeClr val="accent2"/>
+              </a:fillRef>
+              <a:effectRef idx="1">
+                <a:schemeClr val="accent2"/>
+              </a:effectRef>
+              <a:fontRef idx="minor">
+                <a:schemeClr val="dk1"/>
+              </a:fontRef>
+            </p:style>
+            <p:txBody>
+              <a:bodyPr wrap="none" rtlCol="0">
+                <a:spAutoFit/>
+              </a:bodyPr>
+              <a:lstStyle/>
+              <a:p>
+                <a:r>
+                  <a:rPr kumimoji="1" lang="en-US" altLang="zh-CN" u="sng" dirty="0"/>
+                  <a:t>Set Operations:</a:t>
+                </a:r>
+                <a:r>
+                  <a:rPr kumimoji="1" lang="en-US" altLang="zh-CN" dirty="0"/>
+                  <a:t> 		</a:t>
+                </a:r>
+                <a:r>
+                  <a:rPr kumimoji="1" lang="en-US" altLang="zh-CN" dirty="0" err="1">
+                    <a:latin typeface="Chalkboard" panose="03050602040202020205" pitchFamily="66" charset="0"/>
+                  </a:rPr>
+                  <a:t>MovieHasActor</a:t>
+                </a:r>
+                <a:r>
+                  <a:rPr kumimoji="1" lang="en-US" altLang="zh-CN" dirty="0">
+                    <a:latin typeface="Chalkboard" panose="03050602040202020205" pitchFamily="66" charset="0"/>
+                  </a:rPr>
+                  <a:t>(</a:t>
+                </a:r>
+                <a:r>
+                  <a:rPr kumimoji="1" lang="en-US" altLang="zh-CN" dirty="0" err="1">
+                    <a:latin typeface="Chalkboard" panose="03050602040202020205" pitchFamily="66" charset="0"/>
+                  </a:rPr>
+                  <a:t>ActorWon</a:t>
+                </a:r>
+                <a:r>
+                  <a:rPr kumimoji="1" lang="en-US" altLang="zh-CN" dirty="0">
+                    <a:latin typeface="Chalkboard" panose="03050602040202020205" pitchFamily="66" charset="0"/>
+                  </a:rPr>
+                  <a:t>(Oscar)</a:t>
+                </a:r>
+                <a:r>
+                  <a:rPr kumimoji="1" lang="en-US" altLang="zh-CN" dirty="0">
+                    <a:ea typeface="Cambria Math" panose="02040503050406030204" pitchFamily="18" charset="0"/>
+                  </a:rPr>
+                  <a:t> </a:t>
+                </a:r>
+                <a14:m>
+                  <m:oMath xmlns:m="http://schemas.openxmlformats.org/officeDocument/2006/math">
+                    <m:r>
+                      <a:rPr kumimoji="1" lang="en-US" altLang="zh-CN" i="1" smtClean="0">
+                        <a:latin typeface="Cambria Math" panose="02040503050406030204" pitchFamily="18" charset="0"/>
+                        <a:ea typeface="Cambria Math" panose="02040503050406030204" pitchFamily="18" charset="0"/>
+                      </a:rPr>
+                      <m:t>∩</m:t>
+                    </m:r>
+                  </m:oMath>
+                </a14:m>
+                <a:r>
+                  <a:rPr kumimoji="1" lang="en-US" altLang="zh-CN" dirty="0">
+                    <a:latin typeface="Chalkboard" panose="03050602040202020205" pitchFamily="66" charset="0"/>
+                  </a:rPr>
+                  <a:t> </a:t>
+                </a:r>
+                <a:r>
+                  <a:rPr kumimoji="1" lang="en-US" altLang="zh-CN" u="sng" dirty="0">
+                    <a:latin typeface="Chalkboard" panose="03050602040202020205" pitchFamily="66" charset="0"/>
+                  </a:rPr>
+                  <a:t>Not</a:t>
+                </a:r>
+                <a:r>
+                  <a:rPr kumimoji="1" lang="en-US" altLang="zh-CN" dirty="0">
+                    <a:latin typeface="Chalkboard" panose="03050602040202020205" pitchFamily="66" charset="0"/>
+                  </a:rPr>
+                  <a:t>(</a:t>
+                </a:r>
+                <a:r>
+                  <a:rPr kumimoji="1" lang="en-US" altLang="zh-CN" dirty="0" err="1">
+                    <a:latin typeface="Chalkboard" panose="03050602040202020205" pitchFamily="66" charset="0"/>
+                  </a:rPr>
+                  <a:t>ActorWon</a:t>
+                </a:r>
+                <a:r>
+                  <a:rPr kumimoji="1" lang="en-US" altLang="zh-CN" dirty="0">
+                    <a:latin typeface="Chalkboard" panose="03050602040202020205" pitchFamily="66" charset="0"/>
+                  </a:rPr>
+                  <a:t>(Golden globe))) </a:t>
+                </a:r>
+                <a14:m>
+                  <m:oMath xmlns:m="http://schemas.openxmlformats.org/officeDocument/2006/math">
+                    <m:r>
+                      <a:rPr kumimoji="1" lang="en-US" altLang="zh-CN" i="1">
+                        <a:latin typeface="Cambria Math" panose="02040503050406030204" pitchFamily="18" charset="0"/>
+                        <a:ea typeface="Cambria Math" panose="02040503050406030204" pitchFamily="18" charset="0"/>
+                      </a:rPr>
+                      <m:t>∪</m:t>
+                    </m:r>
+                  </m:oMath>
+                </a14:m>
+                <a:r>
+                  <a:rPr kumimoji="1" lang="en-US" altLang="zh-CN" dirty="0">
+                    <a:latin typeface="Chalkboard" panose="03050602040202020205" pitchFamily="66" charset="0"/>
+                  </a:rPr>
+                  <a:t> MoveIsAbout(Love)</a:t>
+                </a:r>
+                <a:endParaRPr kumimoji="1" lang="zh-CN" altLang="en-US" dirty="0">
+                  <a:latin typeface="Chalkboard" panose="03050602040202020205" pitchFamily="66" charset="0"/>
+                </a:endParaRPr>
+              </a:p>
+            </p:txBody>
+          </p:sp>
+        </mc:Choice>
+        <mc:Fallback>
+          <p:sp>
+            <p:nvSpPr>
+              <p:cNvPr id="4" name="文本框 3">
+                <a:extLst>
+                  <a:ext uri="{FF2B5EF4-FFF2-40B4-BE49-F238E27FC236}">
+                    <a16:creationId xmlns:a16="http://schemas.microsoft.com/office/drawing/2014/main" id="{ED9AEDC1-478A-4249-A5D3-6FD911EE7F65}"/>
+                  </a:ext>
+                </a:extLst>
+              </p:cNvPr>
+              <p:cNvSpPr txBox="1">
+                <a:spLocks noRot="1" noChangeAspect="1" noMove="1" noResize="1" noEditPoints="1" noAdjustHandles="1" noChangeArrowheads="1" noChangeShapeType="1" noTextEdit="1"/>
+              </p:cNvSpPr>
+              <p:nvPr/>
+            </p:nvSpPr>
+            <p:spPr>
+              <a:xfrm>
+                <a:off x="2305311" y="2251814"/>
+                <a:ext cx="11508663" cy="369332"/>
+              </a:xfrm>
+              <a:prstGeom prst="rect">
+                <a:avLst/>
+              </a:prstGeom>
+              <a:blipFill>
+                <a:blip r:embed="rId3"/>
+                <a:stretch>
+                  <a:fillRect l="-441" t="-6667" b="-26667"/>
+                </a:stretch>
+              </a:blipFill>
+              <a:ln/>
+            </p:spPr>
+            <p:txBody>
+              <a:bodyPr/>
+              <a:lstStyle/>
+              <a:p>
+                <a:r>
+                  <a:rPr lang="zh-CN" altLang="en-US">
+                    <a:noFill/>
+                  </a:rPr>
+                  <a:t> </a:t>
+                </a:r>
+              </a:p>
+            </p:txBody>
+          </p:sp>
+        </mc:Fallback>
+      </mc:AlternateContent>
+      <p:sp>
+        <p:nvSpPr>
+          <p:cNvPr id="5" name="文本框 4">
+            <a:extLst>
+              <a:ext uri="{FF2B5EF4-FFF2-40B4-BE49-F238E27FC236}">
+                <a16:creationId xmlns:a16="http://schemas.microsoft.com/office/drawing/2014/main" id="{821A5EC8-21FC-014D-894D-011942B08AE4}"/>
+              </a:ext>
+            </a:extLst>
+          </p:cNvPr>
+          <p:cNvSpPr txBox="1"/>
+          <p:nvPr/>
+        </p:nvSpPr>
+        <p:spPr>
+          <a:xfrm>
+            <a:off x="2305311" y="2671540"/>
+            <a:ext cx="953274" cy="369332"/>
+          </a:xfrm>
+          <a:prstGeom prst="rect">
+            <a:avLst/>
+          </a:prstGeom>
+          <a:ln/>
+        </p:spPr>
+        <p:style>
+          <a:lnRef idx="1">
+            <a:schemeClr val="accent3"/>
+          </a:lnRef>
+          <a:fillRef idx="2">
+            <a:schemeClr val="accent3"/>
+          </a:fillRef>
+          <a:effectRef idx="1">
+            <a:schemeClr val="accent3"/>
+          </a:effectRef>
+          <a:fontRef idx="minor">
+            <a:schemeClr val="dk1"/>
+          </a:fontRef>
+        </p:style>
+        <p:txBody>
+          <a:bodyPr wrap="none" rtlCol="0">
+            <a:spAutoFit/>
+          </a:bodyPr>
+          <a:lstStyle/>
+          <a:p>
+            <a:r>
+              <a:rPr kumimoji="1" lang="en-US" altLang="zh-CN" u="sng" dirty="0" err="1"/>
+              <a:t>OpsTree</a:t>
+            </a:r>
+            <a:endParaRPr kumimoji="1" lang="zh-CN" altLang="en-US" u="sng" dirty="0"/>
+          </a:p>
+        </p:txBody>
+      </p:sp>
+      <p:grpSp>
+        <p:nvGrpSpPr>
+          <p:cNvPr id="94" name="组合 93">
+            <a:extLst>
+              <a:ext uri="{FF2B5EF4-FFF2-40B4-BE49-F238E27FC236}">
+                <a16:creationId xmlns:a16="http://schemas.microsoft.com/office/drawing/2014/main" id="{F4AD3412-20C3-CF42-8702-D9BE69257E33}"/>
+              </a:ext>
+            </a:extLst>
+          </p:cNvPr>
+          <p:cNvGrpSpPr/>
+          <p:nvPr/>
+        </p:nvGrpSpPr>
+        <p:grpSpPr>
+          <a:xfrm>
+            <a:off x="3505117" y="2645028"/>
+            <a:ext cx="8765236" cy="2112535"/>
+            <a:chOff x="3527661" y="2922124"/>
+            <a:chExt cx="8765236" cy="2112535"/>
+          </a:xfrm>
+        </p:grpSpPr>
+        <p:sp>
+          <p:nvSpPr>
+            <p:cNvPr id="6" name="椭圆 5">
+              <a:extLst>
+                <a:ext uri="{FF2B5EF4-FFF2-40B4-BE49-F238E27FC236}">
+                  <a16:creationId xmlns:a16="http://schemas.microsoft.com/office/drawing/2014/main" id="{02BF91B4-195F-6049-9602-02C3B5B9389E}"/>
+                </a:ext>
+              </a:extLst>
+            </p:cNvPr>
+            <p:cNvSpPr/>
+            <p:nvPr/>
+          </p:nvSpPr>
+          <p:spPr>
+            <a:xfrm>
+              <a:off x="4572000" y="3370929"/>
+              <a:ext cx="360000" cy="360000"/>
+            </a:xfrm>
+            <a:prstGeom prst="ellipse">
+              <a:avLst/>
+            </a:prstGeom>
+            <a:ln w="19050">
+              <a:solidFill>
+                <a:schemeClr val="tx1"/>
+              </a:solidFill>
+              <a:prstDash val="solid"/>
+            </a:ln>
+          </p:spPr>
+          <p:style>
+            <a:lnRef idx="1">
+              <a:schemeClr val="accent5"/>
+            </a:lnRef>
+            <a:fillRef idx="2">
+              <a:schemeClr val="accent5"/>
+            </a:fillRef>
+            <a:effectRef idx="1">
+              <a:schemeClr val="accent5"/>
+            </a:effectRef>
+            <a:fontRef idx="minor">
+              <a:schemeClr val="dk1"/>
+            </a:fontRef>
+          </p:style>
+          <p:txBody>
+            <a:bodyPr rtlCol="0" anchor="ctr"/>
+            <a:lstStyle/>
+            <a:p>
+              <a:pPr algn="ctr"/>
+              <a:endParaRPr kumimoji="1" lang="zh-CN" altLang="en-US"/>
+            </a:p>
+          </p:txBody>
+        </p:sp>
+        <p:sp>
+          <p:nvSpPr>
+            <p:cNvPr id="7" name="文本框 6">
+              <a:extLst>
+                <a:ext uri="{FF2B5EF4-FFF2-40B4-BE49-F238E27FC236}">
+                  <a16:creationId xmlns:a16="http://schemas.microsoft.com/office/drawing/2014/main" id="{A73CEFEE-5879-3340-9982-BEC6F85F51BF}"/>
+                </a:ext>
+              </a:extLst>
+            </p:cNvPr>
+            <p:cNvSpPr txBox="1"/>
+            <p:nvPr/>
+          </p:nvSpPr>
+          <p:spPr>
+            <a:xfrm>
+              <a:off x="3603161" y="3368362"/>
+              <a:ext cx="713337" cy="369332"/>
+            </a:xfrm>
+            <a:prstGeom prst="rect">
+              <a:avLst/>
+            </a:prstGeom>
+            <a:noFill/>
+          </p:spPr>
+          <p:txBody>
+            <a:bodyPr wrap="none" rtlCol="0">
+              <a:spAutoFit/>
+            </a:bodyPr>
+            <a:lstStyle/>
+            <a:p>
+              <a:r>
+                <a:rPr kumimoji="1" lang="en-US" altLang="zh-CN" dirty="0"/>
+                <a:t>Oscar</a:t>
+              </a:r>
+              <a:endParaRPr kumimoji="1" lang="zh-CN" altLang="en-US" dirty="0"/>
+            </a:p>
+          </p:txBody>
+        </p:sp>
+        <p:sp>
+          <p:nvSpPr>
+            <p:cNvPr id="8" name="椭圆 7">
+              <a:extLst>
+                <a:ext uri="{FF2B5EF4-FFF2-40B4-BE49-F238E27FC236}">
+                  <a16:creationId xmlns:a16="http://schemas.microsoft.com/office/drawing/2014/main" id="{B2A17B52-4EF8-C245-816D-F1EB4BCE46B6}"/>
+                </a:ext>
+              </a:extLst>
+            </p:cNvPr>
+            <p:cNvSpPr/>
+            <p:nvPr/>
+          </p:nvSpPr>
+          <p:spPr>
+            <a:xfrm>
+              <a:off x="4572000" y="4201709"/>
+              <a:ext cx="360000" cy="360000"/>
+            </a:xfrm>
+            <a:prstGeom prst="ellipse">
+              <a:avLst/>
+            </a:prstGeom>
+            <a:ln w="19050">
+              <a:solidFill>
+                <a:schemeClr val="tx1"/>
+              </a:solidFill>
+              <a:prstDash val="solid"/>
+            </a:ln>
+          </p:spPr>
+          <p:style>
+            <a:lnRef idx="1">
+              <a:schemeClr val="accent5"/>
+            </a:lnRef>
+            <a:fillRef idx="2">
+              <a:schemeClr val="accent5"/>
+            </a:fillRef>
+            <a:effectRef idx="1">
+              <a:schemeClr val="accent5"/>
+            </a:effectRef>
+            <a:fontRef idx="minor">
+              <a:schemeClr val="dk1"/>
+            </a:fontRef>
+          </p:style>
+          <p:txBody>
+            <a:bodyPr rtlCol="0" anchor="ctr"/>
+            <a:lstStyle/>
+            <a:p>
+              <a:pPr algn="ctr"/>
+              <a:endParaRPr kumimoji="1" lang="zh-CN" altLang="en-US"/>
+            </a:p>
+          </p:txBody>
+        </p:sp>
+        <p:sp>
+          <p:nvSpPr>
+            <p:cNvPr id="9" name="文本框 8">
+              <a:extLst>
+                <a:ext uri="{FF2B5EF4-FFF2-40B4-BE49-F238E27FC236}">
+                  <a16:creationId xmlns:a16="http://schemas.microsoft.com/office/drawing/2014/main" id="{D5001CBA-8730-A045-9397-7A9CCCF6E20B}"/>
+                </a:ext>
+              </a:extLst>
+            </p:cNvPr>
+            <p:cNvSpPr txBox="1"/>
+            <p:nvPr/>
+          </p:nvSpPr>
+          <p:spPr>
+            <a:xfrm>
+              <a:off x="3527661" y="4018996"/>
+              <a:ext cx="864339" cy="646331"/>
+            </a:xfrm>
+            <a:prstGeom prst="rect">
+              <a:avLst/>
+            </a:prstGeom>
+            <a:noFill/>
+          </p:spPr>
+          <p:txBody>
+            <a:bodyPr wrap="none" rtlCol="0">
+              <a:spAutoFit/>
+            </a:bodyPr>
+            <a:lstStyle/>
+            <a:p>
+              <a:r>
+                <a:rPr kumimoji="1" lang="en-US" altLang="zh-CN" dirty="0"/>
+                <a:t>Golden</a:t>
+              </a:r>
+            </a:p>
+            <a:p>
+              <a:r>
+                <a:rPr kumimoji="1" lang="en-US" altLang="zh-CN" dirty="0"/>
+                <a:t>Globe</a:t>
+              </a:r>
+              <a:endParaRPr kumimoji="1" lang="zh-CN" altLang="en-US" dirty="0"/>
+            </a:p>
+          </p:txBody>
+        </p:sp>
+        <p:cxnSp>
+          <p:nvCxnSpPr>
+            <p:cNvPr id="14" name="直线箭头连接符 13">
+              <a:extLst>
+                <a:ext uri="{FF2B5EF4-FFF2-40B4-BE49-F238E27FC236}">
+                  <a16:creationId xmlns:a16="http://schemas.microsoft.com/office/drawing/2014/main" id="{E6E3B0F0-FDE4-654A-8804-BBA8AC890F48}"/>
+                </a:ext>
+              </a:extLst>
+            </p:cNvPr>
+            <p:cNvCxnSpPr>
+              <a:cxnSpLocks/>
+              <a:stCxn id="6" idx="6"/>
+              <a:endCxn id="11" idx="2"/>
+            </p:cNvCxnSpPr>
+            <p:nvPr/>
+          </p:nvCxnSpPr>
+          <p:spPr>
+            <a:xfrm flipV="1">
+              <a:off x="4932000" y="3548362"/>
+              <a:ext cx="1051780" cy="2567"/>
+            </a:xfrm>
+            <a:prstGeom prst="straightConnector1">
+              <a:avLst/>
+            </a:prstGeom>
+            <a:ln>
+              <a:tailEnd type="triangle"/>
+            </a:ln>
+          </p:spPr>
+          <p:style>
+            <a:lnRef idx="3">
+              <a:schemeClr val="dk1"/>
+            </a:lnRef>
+            <a:fillRef idx="0">
+              <a:schemeClr val="dk1"/>
+            </a:fillRef>
+            <a:effectRef idx="2">
+              <a:schemeClr val="dk1"/>
+            </a:effectRef>
+            <a:fontRef idx="minor">
+              <a:schemeClr val="tx1"/>
+            </a:fontRef>
+          </p:style>
+        </p:cxnSp>
+        <p:cxnSp>
+          <p:nvCxnSpPr>
+            <p:cNvPr id="16" name="直线箭头连接符 15">
+              <a:extLst>
+                <a:ext uri="{FF2B5EF4-FFF2-40B4-BE49-F238E27FC236}">
+                  <a16:creationId xmlns:a16="http://schemas.microsoft.com/office/drawing/2014/main" id="{9338294A-201E-BA46-8A63-3010A34C829A}"/>
+                </a:ext>
+              </a:extLst>
+            </p:cNvPr>
+            <p:cNvCxnSpPr>
+              <a:stCxn id="8" idx="6"/>
+              <a:endCxn id="12" idx="2"/>
+            </p:cNvCxnSpPr>
+            <p:nvPr/>
+          </p:nvCxnSpPr>
+          <p:spPr>
+            <a:xfrm>
+              <a:off x="4932000" y="4381709"/>
+              <a:ext cx="815082" cy="0"/>
+            </a:xfrm>
+            <a:prstGeom prst="straightConnector1">
+              <a:avLst/>
+            </a:prstGeom>
+            <a:ln>
+              <a:tailEnd type="triangle"/>
+            </a:ln>
+          </p:spPr>
+          <p:style>
+            <a:lnRef idx="3">
+              <a:schemeClr val="dk1"/>
+            </a:lnRef>
+            <a:fillRef idx="0">
+              <a:schemeClr val="dk1"/>
+            </a:fillRef>
+            <a:effectRef idx="2">
+              <a:schemeClr val="dk1"/>
+            </a:effectRef>
+            <a:fontRef idx="minor">
+              <a:schemeClr val="tx1"/>
+            </a:fontRef>
+          </p:style>
+        </p:cxnSp>
+        <p:grpSp>
+          <p:nvGrpSpPr>
+            <p:cNvPr id="86" name="组合 85">
+              <a:extLst>
+                <a:ext uri="{FF2B5EF4-FFF2-40B4-BE49-F238E27FC236}">
+                  <a16:creationId xmlns:a16="http://schemas.microsoft.com/office/drawing/2014/main" id="{222D64B5-9B29-A44A-927C-24B211CBF4EB}"/>
+                </a:ext>
+              </a:extLst>
+            </p:cNvPr>
+            <p:cNvGrpSpPr/>
+            <p:nvPr/>
+          </p:nvGrpSpPr>
+          <p:grpSpPr>
+            <a:xfrm>
+              <a:off x="5361415" y="4201709"/>
+              <a:ext cx="1131335" cy="832950"/>
+              <a:chOff x="5992166" y="4325542"/>
+              <a:chExt cx="1131335" cy="832950"/>
+            </a:xfrm>
+          </p:grpSpPr>
+          <p:sp>
+            <p:nvSpPr>
+              <p:cNvPr id="12" name="椭圆 11">
+                <a:extLst>
+                  <a:ext uri="{FF2B5EF4-FFF2-40B4-BE49-F238E27FC236}">
+                    <a16:creationId xmlns:a16="http://schemas.microsoft.com/office/drawing/2014/main" id="{2F7AC7A2-B270-5E43-9FBB-B2D01B6525C4}"/>
+                  </a:ext>
+                </a:extLst>
+              </p:cNvPr>
+              <p:cNvSpPr/>
+              <p:nvPr/>
+            </p:nvSpPr>
+            <p:spPr>
+              <a:xfrm>
+                <a:off x="6377833" y="4325542"/>
+                <a:ext cx="360000" cy="360000"/>
+              </a:xfrm>
+              <a:prstGeom prst="ellipse">
+                <a:avLst/>
+              </a:prstGeom>
+              <a:ln/>
+            </p:spPr>
+            <p:style>
+              <a:lnRef idx="1">
+                <a:schemeClr val="accent3"/>
+              </a:lnRef>
+              <a:fillRef idx="2">
+                <a:schemeClr val="accent3"/>
+              </a:fillRef>
+              <a:effectRef idx="1">
+                <a:schemeClr val="accent3"/>
+              </a:effectRef>
+              <a:fontRef idx="minor">
+                <a:schemeClr val="dk1"/>
+              </a:fontRef>
+            </p:style>
+            <p:txBody>
+              <a:bodyPr rtlCol="0" anchor="ctr"/>
+              <a:lstStyle/>
+              <a:p>
+                <a:pPr algn="ctr"/>
+                <a:endParaRPr kumimoji="1" lang="zh-CN" altLang="en-US"/>
+              </a:p>
+            </p:txBody>
+          </p:sp>
+          <p:sp>
+            <p:nvSpPr>
+              <p:cNvPr id="20" name="文本框 19">
+                <a:extLst>
+                  <a:ext uri="{FF2B5EF4-FFF2-40B4-BE49-F238E27FC236}">
+                    <a16:creationId xmlns:a16="http://schemas.microsoft.com/office/drawing/2014/main" id="{7B0B5BA7-B2E7-3243-B565-17AAA22003DD}"/>
+                  </a:ext>
+                </a:extLst>
+              </p:cNvPr>
+              <p:cNvSpPr txBox="1"/>
+              <p:nvPr/>
+            </p:nvSpPr>
+            <p:spPr>
+              <a:xfrm>
+                <a:off x="5992166" y="4789160"/>
+                <a:ext cx="1131335" cy="369332"/>
+              </a:xfrm>
+              <a:prstGeom prst="rect">
+                <a:avLst/>
+              </a:prstGeom>
+              <a:noFill/>
+            </p:spPr>
+            <p:txBody>
+              <a:bodyPr wrap="none" rtlCol="0">
+                <a:spAutoFit/>
+              </a:bodyPr>
+              <a:lstStyle/>
+              <a:p>
+                <a:r>
+                  <a:rPr kumimoji="1" lang="en-US" altLang="zh-CN" dirty="0" err="1"/>
+                  <a:t>ActorWon</a:t>
+                </a:r>
+                <a:endParaRPr kumimoji="1" lang="zh-CN" altLang="en-US" dirty="0"/>
+              </a:p>
+            </p:txBody>
+          </p:sp>
+        </p:grpSp>
+        <p:cxnSp>
+          <p:nvCxnSpPr>
+            <p:cNvPr id="23" name="直线箭头连接符 22">
+              <a:extLst>
+                <a:ext uri="{FF2B5EF4-FFF2-40B4-BE49-F238E27FC236}">
+                  <a16:creationId xmlns:a16="http://schemas.microsoft.com/office/drawing/2014/main" id="{1846D897-FE89-9240-87B7-44C9A8C29369}"/>
+                </a:ext>
+              </a:extLst>
+            </p:cNvPr>
+            <p:cNvCxnSpPr>
+              <a:cxnSpLocks/>
+              <a:stCxn id="12" idx="6"/>
+              <a:endCxn id="19" idx="2"/>
+            </p:cNvCxnSpPr>
+            <p:nvPr/>
+          </p:nvCxnSpPr>
+          <p:spPr>
+            <a:xfrm>
+              <a:off x="6107082" y="4381709"/>
+              <a:ext cx="1153013" cy="0"/>
+            </a:xfrm>
+            <a:prstGeom prst="straightConnector1">
+              <a:avLst/>
+            </a:prstGeom>
+            <a:ln>
+              <a:tailEnd type="triangle"/>
+            </a:ln>
+          </p:spPr>
+          <p:style>
+            <a:lnRef idx="3">
+              <a:schemeClr val="dk1"/>
+            </a:lnRef>
+            <a:fillRef idx="0">
+              <a:schemeClr val="dk1"/>
+            </a:fillRef>
+            <a:effectRef idx="2">
+              <a:schemeClr val="dk1"/>
+            </a:effectRef>
+            <a:fontRef idx="minor">
+              <a:schemeClr val="tx1"/>
+            </a:fontRef>
+          </p:style>
+        </p:cxnSp>
+        <p:grpSp>
+          <p:nvGrpSpPr>
+            <p:cNvPr id="85" name="组合 84">
+              <a:extLst>
+                <a:ext uri="{FF2B5EF4-FFF2-40B4-BE49-F238E27FC236}">
+                  <a16:creationId xmlns:a16="http://schemas.microsoft.com/office/drawing/2014/main" id="{D5DE2284-EA3D-7745-A4CB-0648972736F3}"/>
+                </a:ext>
+              </a:extLst>
+            </p:cNvPr>
+            <p:cNvGrpSpPr/>
+            <p:nvPr/>
+          </p:nvGrpSpPr>
+          <p:grpSpPr>
+            <a:xfrm>
+              <a:off x="6922165" y="4201709"/>
+              <a:ext cx="1035861" cy="832950"/>
+              <a:chOff x="7645137" y="4325542"/>
+              <a:chExt cx="1035861" cy="832950"/>
+            </a:xfrm>
+          </p:grpSpPr>
+          <p:sp>
+            <p:nvSpPr>
+              <p:cNvPr id="19" name="椭圆 18">
+                <a:extLst>
+                  <a:ext uri="{FF2B5EF4-FFF2-40B4-BE49-F238E27FC236}">
+                    <a16:creationId xmlns:a16="http://schemas.microsoft.com/office/drawing/2014/main" id="{87C0C030-901A-CB4E-BBEC-807DC3F3B456}"/>
+                  </a:ext>
+                </a:extLst>
+              </p:cNvPr>
+              <p:cNvSpPr/>
+              <p:nvPr/>
+            </p:nvSpPr>
+            <p:spPr>
+              <a:xfrm>
+                <a:off x="7983067" y="4325542"/>
+                <a:ext cx="360000" cy="360000"/>
+              </a:xfrm>
+              <a:prstGeom prst="ellipse">
+                <a:avLst/>
+              </a:prstGeom>
+            </p:spPr>
+            <p:style>
+              <a:lnRef idx="1">
+                <a:schemeClr val="accent2"/>
+              </a:lnRef>
+              <a:fillRef idx="2">
+                <a:schemeClr val="accent2"/>
+              </a:fillRef>
+              <a:effectRef idx="1">
+                <a:schemeClr val="accent2"/>
+              </a:effectRef>
+              <a:fontRef idx="minor">
+                <a:schemeClr val="dk1"/>
+              </a:fontRef>
+            </p:style>
+            <p:txBody>
+              <a:bodyPr rtlCol="0" anchor="ctr"/>
+              <a:lstStyle/>
+              <a:p>
+                <a:pPr algn="ctr"/>
+                <a:endParaRPr kumimoji="1" lang="zh-CN" altLang="en-US"/>
+              </a:p>
+            </p:txBody>
+          </p:sp>
+          <p:sp>
+            <p:nvSpPr>
+              <p:cNvPr id="24" name="文本框 23">
+                <a:extLst>
+                  <a:ext uri="{FF2B5EF4-FFF2-40B4-BE49-F238E27FC236}">
+                    <a16:creationId xmlns:a16="http://schemas.microsoft.com/office/drawing/2014/main" id="{FF80FA24-2883-314D-9E73-64708FD56E5D}"/>
+                  </a:ext>
+                </a:extLst>
+              </p:cNvPr>
+              <p:cNvSpPr txBox="1"/>
+              <p:nvPr/>
+            </p:nvSpPr>
+            <p:spPr>
+              <a:xfrm>
+                <a:off x="7645137" y="4789160"/>
+                <a:ext cx="1035861" cy="369332"/>
+              </a:xfrm>
+              <a:prstGeom prst="rect">
+                <a:avLst/>
+              </a:prstGeom>
+              <a:noFill/>
+            </p:spPr>
+            <p:txBody>
+              <a:bodyPr wrap="none" rtlCol="0">
+                <a:spAutoFit/>
+              </a:bodyPr>
+              <a:lstStyle/>
+              <a:p>
+                <a:r>
+                  <a:rPr kumimoji="1" lang="en-US" altLang="zh-CN" dirty="0"/>
+                  <a:t>Negation</a:t>
+                </a:r>
+                <a:endParaRPr kumimoji="1" lang="zh-CN" altLang="en-US" dirty="0"/>
+              </a:p>
+            </p:txBody>
+          </p:sp>
+        </p:grpSp>
+        <p:cxnSp>
+          <p:nvCxnSpPr>
+            <p:cNvPr id="31" name="直线箭头连接符 30">
+              <a:extLst>
+                <a:ext uri="{FF2B5EF4-FFF2-40B4-BE49-F238E27FC236}">
+                  <a16:creationId xmlns:a16="http://schemas.microsoft.com/office/drawing/2014/main" id="{2DA847A7-42FD-5B4B-AE7E-25074E04D14F}"/>
+                </a:ext>
+              </a:extLst>
+            </p:cNvPr>
+            <p:cNvCxnSpPr>
+              <a:cxnSpLocks/>
+              <a:stCxn id="11" idx="6"/>
+              <a:endCxn id="28" idx="2"/>
+            </p:cNvCxnSpPr>
+            <p:nvPr/>
+          </p:nvCxnSpPr>
+          <p:spPr>
+            <a:xfrm>
+              <a:off x="6343780" y="3548362"/>
+              <a:ext cx="1524075" cy="0"/>
+            </a:xfrm>
+            <a:prstGeom prst="straightConnector1">
+              <a:avLst/>
+            </a:prstGeom>
+            <a:ln>
+              <a:tailEnd type="triangle"/>
+            </a:ln>
+          </p:spPr>
+          <p:style>
+            <a:lnRef idx="3">
+              <a:schemeClr val="dk1"/>
+            </a:lnRef>
+            <a:fillRef idx="0">
+              <a:schemeClr val="dk1"/>
+            </a:fillRef>
+            <a:effectRef idx="2">
+              <a:schemeClr val="dk1"/>
+            </a:effectRef>
+            <a:fontRef idx="minor">
+              <a:schemeClr val="tx1"/>
+            </a:fontRef>
+          </p:style>
+        </p:cxnSp>
+        <p:cxnSp>
+          <p:nvCxnSpPr>
+            <p:cNvPr id="33" name="直线箭头连接符 32">
+              <a:extLst>
+                <a:ext uri="{FF2B5EF4-FFF2-40B4-BE49-F238E27FC236}">
+                  <a16:creationId xmlns:a16="http://schemas.microsoft.com/office/drawing/2014/main" id="{61AD668D-591F-1842-A064-80DEAF42E933}"/>
+                </a:ext>
+              </a:extLst>
+            </p:cNvPr>
+            <p:cNvCxnSpPr>
+              <a:cxnSpLocks/>
+              <a:stCxn id="19" idx="7"/>
+              <a:endCxn id="28" idx="3"/>
+            </p:cNvCxnSpPr>
+            <p:nvPr/>
+          </p:nvCxnSpPr>
+          <p:spPr>
+            <a:xfrm flipV="1">
+              <a:off x="7567374" y="3675641"/>
+              <a:ext cx="353202" cy="578789"/>
+            </a:xfrm>
+            <a:prstGeom prst="straightConnector1">
+              <a:avLst/>
+            </a:prstGeom>
+            <a:ln>
+              <a:tailEnd type="triangle"/>
+            </a:ln>
+          </p:spPr>
+          <p:style>
+            <a:lnRef idx="3">
+              <a:schemeClr val="dk1"/>
+            </a:lnRef>
+            <a:fillRef idx="0">
+              <a:schemeClr val="dk1"/>
+            </a:fillRef>
+            <a:effectRef idx="2">
+              <a:schemeClr val="dk1"/>
+            </a:effectRef>
+            <a:fontRef idx="minor">
+              <a:schemeClr val="tx1"/>
+            </a:fontRef>
+          </p:style>
+        </p:cxnSp>
+        <p:grpSp>
+          <p:nvGrpSpPr>
+            <p:cNvPr id="80" name="组合 79">
+              <a:extLst>
+                <a:ext uri="{FF2B5EF4-FFF2-40B4-BE49-F238E27FC236}">
+                  <a16:creationId xmlns:a16="http://schemas.microsoft.com/office/drawing/2014/main" id="{7586876B-85D3-894D-80F4-88C308CE7AE7}"/>
+                </a:ext>
+              </a:extLst>
+            </p:cNvPr>
+            <p:cNvGrpSpPr/>
+            <p:nvPr/>
+          </p:nvGrpSpPr>
+          <p:grpSpPr>
+            <a:xfrm>
+              <a:off x="7395561" y="2922124"/>
+              <a:ext cx="1304588" cy="806238"/>
+              <a:chOff x="7925312" y="3045957"/>
+              <a:chExt cx="1304588" cy="806238"/>
+            </a:xfrm>
+          </p:grpSpPr>
+          <p:sp>
+            <p:nvSpPr>
+              <p:cNvPr id="28" name="椭圆 27">
+                <a:extLst>
+                  <a:ext uri="{FF2B5EF4-FFF2-40B4-BE49-F238E27FC236}">
+                    <a16:creationId xmlns:a16="http://schemas.microsoft.com/office/drawing/2014/main" id="{C87BF3E9-42AA-D045-B3AC-C2EE9F231DD4}"/>
+                  </a:ext>
+                </a:extLst>
+              </p:cNvPr>
+              <p:cNvSpPr/>
+              <p:nvPr/>
+            </p:nvSpPr>
+            <p:spPr>
+              <a:xfrm>
+                <a:off x="8397606" y="3492195"/>
+                <a:ext cx="360000" cy="360000"/>
+              </a:xfrm>
+              <a:prstGeom prst="ellipse">
+                <a:avLst/>
+              </a:prstGeom>
+            </p:spPr>
+            <p:style>
+              <a:lnRef idx="1">
+                <a:schemeClr val="accent4"/>
+              </a:lnRef>
+              <a:fillRef idx="2">
+                <a:schemeClr val="accent4"/>
+              </a:fillRef>
+              <a:effectRef idx="1">
+                <a:schemeClr val="accent4"/>
+              </a:effectRef>
+              <a:fontRef idx="minor">
+                <a:schemeClr val="dk1"/>
+              </a:fontRef>
+            </p:style>
+            <p:txBody>
+              <a:bodyPr rtlCol="0" anchor="ctr"/>
+              <a:lstStyle/>
+              <a:p>
+                <a:pPr algn="ctr"/>
+                <a:endParaRPr kumimoji="1" lang="zh-CN" altLang="en-US"/>
+              </a:p>
+            </p:txBody>
+          </p:sp>
+          <p:sp>
+            <p:nvSpPr>
+              <p:cNvPr id="34" name="文本框 33">
+                <a:extLst>
+                  <a:ext uri="{FF2B5EF4-FFF2-40B4-BE49-F238E27FC236}">
+                    <a16:creationId xmlns:a16="http://schemas.microsoft.com/office/drawing/2014/main" id="{6EBD031A-AF6D-6E44-87A4-BD31C3F996BA}"/>
+                  </a:ext>
+                </a:extLst>
+              </p:cNvPr>
+              <p:cNvSpPr txBox="1"/>
+              <p:nvPr/>
+            </p:nvSpPr>
+            <p:spPr>
+              <a:xfrm>
+                <a:off x="7925312" y="3045957"/>
+                <a:ext cx="1304588" cy="369332"/>
+              </a:xfrm>
+              <a:prstGeom prst="rect">
+                <a:avLst/>
+              </a:prstGeom>
+              <a:noFill/>
+            </p:spPr>
+            <p:txBody>
+              <a:bodyPr wrap="none" rtlCol="0">
+                <a:spAutoFit/>
+              </a:bodyPr>
+              <a:lstStyle/>
+              <a:p>
+                <a:r>
+                  <a:rPr kumimoji="1" lang="en-US" altLang="zh-CN" dirty="0"/>
+                  <a:t>Intersection</a:t>
+                </a:r>
+                <a:endParaRPr kumimoji="1" lang="zh-CN" altLang="en-US" dirty="0"/>
+              </a:p>
+            </p:txBody>
+          </p:sp>
+        </p:grpSp>
+        <p:cxnSp>
+          <p:nvCxnSpPr>
+            <p:cNvPr id="41" name="直线箭头连接符 40">
+              <a:extLst>
+                <a:ext uri="{FF2B5EF4-FFF2-40B4-BE49-F238E27FC236}">
+                  <a16:creationId xmlns:a16="http://schemas.microsoft.com/office/drawing/2014/main" id="{E582F620-0BAA-AA4F-A594-EC52EC8F3D84}"/>
+                </a:ext>
+              </a:extLst>
+            </p:cNvPr>
+            <p:cNvCxnSpPr>
+              <a:cxnSpLocks/>
+              <a:stCxn id="28" idx="6"/>
+              <a:endCxn id="35" idx="2"/>
+            </p:cNvCxnSpPr>
+            <p:nvPr/>
+          </p:nvCxnSpPr>
+          <p:spPr>
+            <a:xfrm>
+              <a:off x="8227855" y="3548362"/>
+              <a:ext cx="1772059" cy="0"/>
+            </a:xfrm>
+            <a:prstGeom prst="straightConnector1">
+              <a:avLst/>
+            </a:prstGeom>
+            <a:ln>
+              <a:tailEnd type="triangle"/>
+            </a:ln>
+          </p:spPr>
+          <p:style>
+            <a:lnRef idx="3">
+              <a:schemeClr val="dk1"/>
+            </a:lnRef>
+            <a:fillRef idx="0">
+              <a:schemeClr val="dk1"/>
+            </a:fillRef>
+            <a:effectRef idx="2">
+              <a:schemeClr val="dk1"/>
+            </a:effectRef>
+            <a:fontRef idx="minor">
+              <a:schemeClr val="tx1"/>
+            </a:fontRef>
+          </p:style>
+        </p:cxnSp>
+        <p:grpSp>
+          <p:nvGrpSpPr>
+            <p:cNvPr id="81" name="组合 80">
+              <a:extLst>
+                <a:ext uri="{FF2B5EF4-FFF2-40B4-BE49-F238E27FC236}">
+                  <a16:creationId xmlns:a16="http://schemas.microsoft.com/office/drawing/2014/main" id="{F0735044-5C3B-2B40-9A28-C5ADB0DBED28}"/>
+                </a:ext>
+              </a:extLst>
+            </p:cNvPr>
+            <p:cNvGrpSpPr/>
+            <p:nvPr/>
+          </p:nvGrpSpPr>
+          <p:grpSpPr>
+            <a:xfrm>
+              <a:off x="9366262" y="2922124"/>
+              <a:ext cx="1627305" cy="806238"/>
+              <a:chOff x="9474970" y="3045957"/>
+              <a:chExt cx="1627305" cy="806238"/>
+            </a:xfrm>
+          </p:grpSpPr>
+          <p:sp>
+            <p:nvSpPr>
+              <p:cNvPr id="35" name="椭圆 34">
+                <a:extLst>
+                  <a:ext uri="{FF2B5EF4-FFF2-40B4-BE49-F238E27FC236}">
+                    <a16:creationId xmlns:a16="http://schemas.microsoft.com/office/drawing/2014/main" id="{ECC21553-0AC5-734C-918B-D892B7D2257F}"/>
+                  </a:ext>
+                </a:extLst>
+              </p:cNvPr>
+              <p:cNvSpPr/>
+              <p:nvPr/>
+            </p:nvSpPr>
+            <p:spPr>
+              <a:xfrm>
+                <a:off x="10108622" y="3492195"/>
+                <a:ext cx="360000" cy="360000"/>
+              </a:xfrm>
+              <a:prstGeom prst="ellipse">
+                <a:avLst/>
+              </a:prstGeom>
+              <a:ln/>
+            </p:spPr>
+            <p:style>
+              <a:lnRef idx="1">
+                <a:schemeClr val="accent3"/>
+              </a:lnRef>
+              <a:fillRef idx="2">
+                <a:schemeClr val="accent3"/>
+              </a:fillRef>
+              <a:effectRef idx="1">
+                <a:schemeClr val="accent3"/>
+              </a:effectRef>
+              <a:fontRef idx="minor">
+                <a:schemeClr val="dk1"/>
+              </a:fontRef>
+            </p:style>
+            <p:txBody>
+              <a:bodyPr rtlCol="0" anchor="ctr"/>
+              <a:lstStyle/>
+              <a:p>
+                <a:pPr algn="ctr"/>
+                <a:endParaRPr kumimoji="1" lang="zh-CN" altLang="en-US"/>
+              </a:p>
+            </p:txBody>
+          </p:sp>
+          <p:sp>
+            <p:nvSpPr>
+              <p:cNvPr id="49" name="文本框 48">
+                <a:extLst>
+                  <a:ext uri="{FF2B5EF4-FFF2-40B4-BE49-F238E27FC236}">
+                    <a16:creationId xmlns:a16="http://schemas.microsoft.com/office/drawing/2014/main" id="{9B61E87B-CE88-A14D-9E2E-C0D4279882EA}"/>
+                  </a:ext>
+                </a:extLst>
+              </p:cNvPr>
+              <p:cNvSpPr txBox="1"/>
+              <p:nvPr/>
+            </p:nvSpPr>
+            <p:spPr>
+              <a:xfrm>
+                <a:off x="9474970" y="3045957"/>
+                <a:ext cx="1627305" cy="369332"/>
+              </a:xfrm>
+              <a:prstGeom prst="rect">
+                <a:avLst/>
+              </a:prstGeom>
+              <a:noFill/>
+            </p:spPr>
+            <p:txBody>
+              <a:bodyPr wrap="none" rtlCol="0">
+                <a:spAutoFit/>
+              </a:bodyPr>
+              <a:lstStyle/>
+              <a:p>
+                <a:r>
+                  <a:rPr kumimoji="1" lang="en-US" altLang="zh-CN" dirty="0" err="1"/>
+                  <a:t>MovieHasActor</a:t>
+                </a:r>
+                <a:endParaRPr kumimoji="1" lang="zh-CN" altLang="en-US" dirty="0"/>
+              </a:p>
+            </p:txBody>
+          </p:sp>
+        </p:grpSp>
+        <p:grpSp>
+          <p:nvGrpSpPr>
+            <p:cNvPr id="84" name="组合 83">
+              <a:extLst>
+                <a:ext uri="{FF2B5EF4-FFF2-40B4-BE49-F238E27FC236}">
+                  <a16:creationId xmlns:a16="http://schemas.microsoft.com/office/drawing/2014/main" id="{381EBD19-9A7E-E541-AC7D-0E66810FEE8A}"/>
+                </a:ext>
+              </a:extLst>
+            </p:cNvPr>
+            <p:cNvGrpSpPr/>
+            <p:nvPr/>
+          </p:nvGrpSpPr>
+          <p:grpSpPr>
+            <a:xfrm>
+              <a:off x="8387441" y="4201709"/>
+              <a:ext cx="620619" cy="832950"/>
+              <a:chOff x="8854351" y="4325542"/>
+              <a:chExt cx="620619" cy="832950"/>
+            </a:xfrm>
+          </p:grpSpPr>
+          <p:sp>
+            <p:nvSpPr>
+              <p:cNvPr id="29" name="椭圆 28">
+                <a:extLst>
+                  <a:ext uri="{FF2B5EF4-FFF2-40B4-BE49-F238E27FC236}">
+                    <a16:creationId xmlns:a16="http://schemas.microsoft.com/office/drawing/2014/main" id="{30528911-1107-E946-871E-055AA73069B1}"/>
+                  </a:ext>
+                </a:extLst>
+              </p:cNvPr>
+              <p:cNvSpPr/>
+              <p:nvPr/>
+            </p:nvSpPr>
+            <p:spPr>
+              <a:xfrm>
+                <a:off x="8984660" y="4325542"/>
+                <a:ext cx="360000" cy="360000"/>
+              </a:xfrm>
+              <a:prstGeom prst="ellipse">
+                <a:avLst/>
+              </a:prstGeom>
+              <a:ln w="19050">
+                <a:solidFill>
+                  <a:schemeClr val="tx1"/>
+                </a:solidFill>
+                <a:prstDash val="solid"/>
+              </a:ln>
+            </p:spPr>
+            <p:style>
+              <a:lnRef idx="1">
+                <a:schemeClr val="accent5"/>
+              </a:lnRef>
+              <a:fillRef idx="2">
+                <a:schemeClr val="accent5"/>
+              </a:fillRef>
+              <a:effectRef idx="1">
+                <a:schemeClr val="accent5"/>
+              </a:effectRef>
+              <a:fontRef idx="minor">
+                <a:schemeClr val="dk1"/>
+              </a:fontRef>
+            </p:style>
+            <p:txBody>
+              <a:bodyPr rtlCol="0" anchor="ctr"/>
+              <a:lstStyle/>
+              <a:p>
+                <a:pPr algn="ctr"/>
+                <a:endParaRPr kumimoji="1" lang="zh-CN" altLang="en-US"/>
+              </a:p>
+            </p:txBody>
+          </p:sp>
+          <p:sp>
+            <p:nvSpPr>
+              <p:cNvPr id="51" name="文本框 50">
+                <a:extLst>
+                  <a:ext uri="{FF2B5EF4-FFF2-40B4-BE49-F238E27FC236}">
+                    <a16:creationId xmlns:a16="http://schemas.microsoft.com/office/drawing/2014/main" id="{399E29A5-562B-1047-814F-103CC8F315B9}"/>
+                  </a:ext>
+                </a:extLst>
+              </p:cNvPr>
+              <p:cNvSpPr txBox="1"/>
+              <p:nvPr/>
+            </p:nvSpPr>
+            <p:spPr>
+              <a:xfrm>
+                <a:off x="8854351" y="4789160"/>
+                <a:ext cx="620619" cy="369332"/>
+              </a:xfrm>
+              <a:prstGeom prst="rect">
+                <a:avLst/>
+              </a:prstGeom>
+              <a:noFill/>
+            </p:spPr>
+            <p:txBody>
+              <a:bodyPr wrap="none" rtlCol="0">
+                <a:spAutoFit/>
+              </a:bodyPr>
+              <a:lstStyle/>
+              <a:p>
+                <a:r>
+                  <a:rPr kumimoji="1" lang="en-US" altLang="zh-CN" dirty="0"/>
+                  <a:t>Love</a:t>
+                </a:r>
+                <a:endParaRPr kumimoji="1" lang="zh-CN" altLang="en-US" dirty="0"/>
+              </a:p>
+            </p:txBody>
+          </p:sp>
+        </p:grpSp>
+        <p:cxnSp>
+          <p:nvCxnSpPr>
+            <p:cNvPr id="53" name="直线箭头连接符 52">
+              <a:extLst>
+                <a:ext uri="{FF2B5EF4-FFF2-40B4-BE49-F238E27FC236}">
+                  <a16:creationId xmlns:a16="http://schemas.microsoft.com/office/drawing/2014/main" id="{F44CA9DA-E228-8E4E-B199-79AFB3B8110E}"/>
+                </a:ext>
+              </a:extLst>
+            </p:cNvPr>
+            <p:cNvCxnSpPr>
+              <a:cxnSpLocks/>
+              <a:stCxn id="29" idx="6"/>
+              <a:endCxn id="52" idx="2"/>
+            </p:cNvCxnSpPr>
+            <p:nvPr/>
+          </p:nvCxnSpPr>
+          <p:spPr>
+            <a:xfrm>
+              <a:off x="8877750" y="4381709"/>
+              <a:ext cx="1128776" cy="0"/>
+            </a:xfrm>
+            <a:prstGeom prst="straightConnector1">
+              <a:avLst/>
+            </a:prstGeom>
+            <a:ln>
+              <a:tailEnd type="triangle"/>
+            </a:ln>
+          </p:spPr>
+          <p:style>
+            <a:lnRef idx="3">
+              <a:schemeClr val="dk1"/>
+            </a:lnRef>
+            <a:fillRef idx="0">
+              <a:schemeClr val="dk1"/>
+            </a:fillRef>
+            <a:effectRef idx="2">
+              <a:schemeClr val="dk1"/>
+            </a:effectRef>
+            <a:fontRef idx="minor">
+              <a:schemeClr val="tx1"/>
+            </a:fontRef>
+          </p:style>
+        </p:cxnSp>
+        <p:grpSp>
+          <p:nvGrpSpPr>
+            <p:cNvPr id="83" name="组合 82">
+              <a:extLst>
+                <a:ext uri="{FF2B5EF4-FFF2-40B4-BE49-F238E27FC236}">
+                  <a16:creationId xmlns:a16="http://schemas.microsoft.com/office/drawing/2014/main" id="{D59E7B1C-D736-5644-B722-EA23C3C53CE9}"/>
+                </a:ext>
+              </a:extLst>
+            </p:cNvPr>
+            <p:cNvGrpSpPr/>
+            <p:nvPr/>
+          </p:nvGrpSpPr>
+          <p:grpSpPr>
+            <a:xfrm>
+              <a:off x="9437475" y="4201709"/>
+              <a:ext cx="1498102" cy="832950"/>
+              <a:chOff x="10146196" y="4325542"/>
+              <a:chExt cx="1498102" cy="832950"/>
+            </a:xfrm>
+          </p:grpSpPr>
+          <p:sp>
+            <p:nvSpPr>
+              <p:cNvPr id="52" name="椭圆 51">
+                <a:extLst>
+                  <a:ext uri="{FF2B5EF4-FFF2-40B4-BE49-F238E27FC236}">
+                    <a16:creationId xmlns:a16="http://schemas.microsoft.com/office/drawing/2014/main" id="{05996509-2646-6646-863F-3E0B703EF089}"/>
+                  </a:ext>
+                </a:extLst>
+              </p:cNvPr>
+              <p:cNvSpPr/>
+              <p:nvPr/>
+            </p:nvSpPr>
+            <p:spPr>
+              <a:xfrm>
+                <a:off x="10715247" y="4325542"/>
+                <a:ext cx="360000" cy="360000"/>
+              </a:xfrm>
+              <a:prstGeom prst="ellipse">
+                <a:avLst/>
+              </a:prstGeom>
+              <a:ln/>
+            </p:spPr>
+            <p:style>
+              <a:lnRef idx="1">
+                <a:schemeClr val="accent3"/>
+              </a:lnRef>
+              <a:fillRef idx="2">
+                <a:schemeClr val="accent3"/>
+              </a:fillRef>
+              <a:effectRef idx="1">
+                <a:schemeClr val="accent3"/>
+              </a:effectRef>
+              <a:fontRef idx="minor">
+                <a:schemeClr val="dk1"/>
+              </a:fontRef>
+            </p:style>
+            <p:txBody>
+              <a:bodyPr rtlCol="0" anchor="ctr"/>
+              <a:lstStyle/>
+              <a:p>
+                <a:pPr algn="ctr"/>
+                <a:endParaRPr kumimoji="1" lang="zh-CN" altLang="en-US"/>
+              </a:p>
+            </p:txBody>
+          </p:sp>
+          <p:sp>
+            <p:nvSpPr>
+              <p:cNvPr id="55" name="文本框 54">
+                <a:extLst>
+                  <a:ext uri="{FF2B5EF4-FFF2-40B4-BE49-F238E27FC236}">
+                    <a16:creationId xmlns:a16="http://schemas.microsoft.com/office/drawing/2014/main" id="{BA70851A-A06D-4643-9E5F-6B6CB611BA7E}"/>
+                  </a:ext>
+                </a:extLst>
+              </p:cNvPr>
+              <p:cNvSpPr txBox="1"/>
+              <p:nvPr/>
+            </p:nvSpPr>
+            <p:spPr>
+              <a:xfrm>
+                <a:off x="10146196" y="4789160"/>
+                <a:ext cx="1498102" cy="369332"/>
+              </a:xfrm>
+              <a:prstGeom prst="rect">
+                <a:avLst/>
+              </a:prstGeom>
+              <a:noFill/>
+            </p:spPr>
+            <p:txBody>
+              <a:bodyPr wrap="none" rtlCol="0">
+                <a:spAutoFit/>
+              </a:bodyPr>
+              <a:lstStyle/>
+              <a:p>
+                <a:r>
+                  <a:rPr kumimoji="1" lang="en-US" altLang="zh-CN" dirty="0" err="1"/>
+                  <a:t>MovieIsAbout</a:t>
+                </a:r>
+                <a:endParaRPr kumimoji="1" lang="zh-CN" altLang="en-US" dirty="0"/>
+              </a:p>
+            </p:txBody>
+          </p:sp>
+        </p:grpSp>
+        <p:grpSp>
+          <p:nvGrpSpPr>
+            <p:cNvPr id="82" name="组合 81">
+              <a:extLst>
+                <a:ext uri="{FF2B5EF4-FFF2-40B4-BE49-F238E27FC236}">
+                  <a16:creationId xmlns:a16="http://schemas.microsoft.com/office/drawing/2014/main" id="{C83C70C7-0151-DA41-8007-D68CA7C4CCD1}"/>
+                </a:ext>
+              </a:extLst>
+            </p:cNvPr>
+            <p:cNvGrpSpPr/>
+            <p:nvPr/>
+          </p:nvGrpSpPr>
+          <p:grpSpPr>
+            <a:xfrm>
+              <a:off x="11542371" y="3325243"/>
+              <a:ext cx="750526" cy="806238"/>
+              <a:chOff x="11622101" y="3045957"/>
+              <a:chExt cx="750526" cy="806238"/>
+            </a:xfrm>
+          </p:grpSpPr>
+          <p:sp>
+            <p:nvSpPr>
+              <p:cNvPr id="70" name="椭圆 69">
+                <a:extLst>
+                  <a:ext uri="{FF2B5EF4-FFF2-40B4-BE49-F238E27FC236}">
+                    <a16:creationId xmlns:a16="http://schemas.microsoft.com/office/drawing/2014/main" id="{2C991E04-E4D1-6A47-897C-CFCF8C249EC8}"/>
+                  </a:ext>
+                </a:extLst>
+              </p:cNvPr>
+              <p:cNvSpPr/>
+              <p:nvPr/>
+            </p:nvSpPr>
+            <p:spPr>
+              <a:xfrm>
+                <a:off x="11817364" y="3492195"/>
+                <a:ext cx="360000" cy="360000"/>
+              </a:xfrm>
+              <a:prstGeom prst="ellipse">
+                <a:avLst/>
+              </a:prstGeom>
+              <a:ln w="19050">
+                <a:solidFill>
+                  <a:schemeClr val="tx1"/>
+                </a:solidFill>
+                <a:prstDash val="dash"/>
+              </a:ln>
+            </p:spPr>
+            <p:style>
+              <a:lnRef idx="1">
+                <a:schemeClr val="accent6"/>
+              </a:lnRef>
+              <a:fillRef idx="2">
+                <a:schemeClr val="accent6"/>
+              </a:fillRef>
+              <a:effectRef idx="1">
+                <a:schemeClr val="accent6"/>
+              </a:effectRef>
+              <a:fontRef idx="minor">
+                <a:schemeClr val="dk1"/>
+              </a:fontRef>
+            </p:style>
+            <p:txBody>
+              <a:bodyPr rtlCol="0" anchor="ctr"/>
+              <a:lstStyle/>
+              <a:p>
+                <a:pPr algn="ctr"/>
+                <a:endParaRPr kumimoji="1" lang="zh-CN" altLang="en-US"/>
+              </a:p>
+            </p:txBody>
+          </p:sp>
+          <p:sp>
+            <p:nvSpPr>
+              <p:cNvPr id="71" name="文本框 70">
+                <a:extLst>
+                  <a:ext uri="{FF2B5EF4-FFF2-40B4-BE49-F238E27FC236}">
+                    <a16:creationId xmlns:a16="http://schemas.microsoft.com/office/drawing/2014/main" id="{8C7A4FBA-519B-AB4C-B31D-7FB90E8EF8B3}"/>
+                  </a:ext>
+                </a:extLst>
+              </p:cNvPr>
+              <p:cNvSpPr txBox="1"/>
+              <p:nvPr/>
+            </p:nvSpPr>
+            <p:spPr>
+              <a:xfrm>
+                <a:off x="11622101" y="3045957"/>
+                <a:ext cx="750526" cy="369332"/>
+              </a:xfrm>
+              <a:prstGeom prst="rect">
+                <a:avLst/>
+              </a:prstGeom>
+              <a:noFill/>
+            </p:spPr>
+            <p:txBody>
+              <a:bodyPr wrap="none" rtlCol="0">
+                <a:spAutoFit/>
+              </a:bodyPr>
+              <a:lstStyle/>
+              <a:p>
+                <a:r>
+                  <a:rPr kumimoji="1" lang="en-US" altLang="zh-CN" dirty="0"/>
+                  <a:t>Union</a:t>
+                </a:r>
+                <a:endParaRPr kumimoji="1" lang="zh-CN" altLang="en-US" dirty="0"/>
+              </a:p>
+            </p:txBody>
+          </p:sp>
+        </p:grpSp>
+        <p:grpSp>
+          <p:nvGrpSpPr>
+            <p:cNvPr id="79" name="组合 78">
+              <a:extLst>
+                <a:ext uri="{FF2B5EF4-FFF2-40B4-BE49-F238E27FC236}">
+                  <a16:creationId xmlns:a16="http://schemas.microsoft.com/office/drawing/2014/main" id="{B17B0871-2841-0C46-BEB9-982C29E46DBE}"/>
+                </a:ext>
+              </a:extLst>
+            </p:cNvPr>
+            <p:cNvGrpSpPr/>
+            <p:nvPr/>
+          </p:nvGrpSpPr>
+          <p:grpSpPr>
+            <a:xfrm>
+              <a:off x="5598113" y="2922124"/>
+              <a:ext cx="1131335" cy="806238"/>
+              <a:chOff x="5992166" y="3045957"/>
+              <a:chExt cx="1131335" cy="806238"/>
+            </a:xfrm>
+          </p:grpSpPr>
+          <p:sp>
+            <p:nvSpPr>
+              <p:cNvPr id="11" name="椭圆 10">
+                <a:extLst>
+                  <a:ext uri="{FF2B5EF4-FFF2-40B4-BE49-F238E27FC236}">
+                    <a16:creationId xmlns:a16="http://schemas.microsoft.com/office/drawing/2014/main" id="{D3F24D3A-F5E1-E344-BFCA-144FE1609DC4}"/>
+                  </a:ext>
+                </a:extLst>
+              </p:cNvPr>
+              <p:cNvSpPr/>
+              <p:nvPr/>
+            </p:nvSpPr>
+            <p:spPr>
+              <a:xfrm>
+                <a:off x="6377833" y="3492195"/>
+                <a:ext cx="360000" cy="360000"/>
+              </a:xfrm>
+              <a:prstGeom prst="ellipse">
+                <a:avLst/>
+              </a:prstGeom>
+              <a:ln/>
+            </p:spPr>
+            <p:style>
+              <a:lnRef idx="1">
+                <a:schemeClr val="accent3"/>
+              </a:lnRef>
+              <a:fillRef idx="2">
+                <a:schemeClr val="accent3"/>
+              </a:fillRef>
+              <a:effectRef idx="1">
+                <a:schemeClr val="accent3"/>
+              </a:effectRef>
+              <a:fontRef idx="minor">
+                <a:schemeClr val="dk1"/>
+              </a:fontRef>
+            </p:style>
+            <p:txBody>
+              <a:bodyPr rtlCol="0" anchor="ctr"/>
+              <a:lstStyle/>
+              <a:p>
+                <a:pPr algn="ctr"/>
+                <a:endParaRPr kumimoji="1" lang="zh-CN" altLang="en-US"/>
+              </a:p>
+            </p:txBody>
+          </p:sp>
+          <p:sp>
+            <p:nvSpPr>
+              <p:cNvPr id="21" name="文本框 20">
+                <a:extLst>
+                  <a:ext uri="{FF2B5EF4-FFF2-40B4-BE49-F238E27FC236}">
+                    <a16:creationId xmlns:a16="http://schemas.microsoft.com/office/drawing/2014/main" id="{F332D9A5-9F2B-0E47-97A9-C4D889E23508}"/>
+                  </a:ext>
+                </a:extLst>
+              </p:cNvPr>
+              <p:cNvSpPr txBox="1"/>
+              <p:nvPr/>
+            </p:nvSpPr>
+            <p:spPr>
+              <a:xfrm>
+                <a:off x="5992166" y="3045957"/>
+                <a:ext cx="1131335" cy="369332"/>
+              </a:xfrm>
+              <a:prstGeom prst="rect">
+                <a:avLst/>
+              </a:prstGeom>
+              <a:noFill/>
+            </p:spPr>
+            <p:txBody>
+              <a:bodyPr wrap="none" rtlCol="0">
+                <a:spAutoFit/>
+              </a:bodyPr>
+              <a:lstStyle/>
+              <a:p>
+                <a:r>
+                  <a:rPr kumimoji="1" lang="en-US" altLang="zh-CN" dirty="0" err="1"/>
+                  <a:t>ActorWon</a:t>
+                </a:r>
+                <a:endParaRPr kumimoji="1" lang="zh-CN" altLang="en-US" dirty="0"/>
+              </a:p>
+            </p:txBody>
+          </p:sp>
+        </p:grpSp>
+        <p:cxnSp>
+          <p:nvCxnSpPr>
+            <p:cNvPr id="88" name="直线箭头连接符 87">
+              <a:extLst>
+                <a:ext uri="{FF2B5EF4-FFF2-40B4-BE49-F238E27FC236}">
+                  <a16:creationId xmlns:a16="http://schemas.microsoft.com/office/drawing/2014/main" id="{E8BE870C-2390-414C-806B-394351304DCB}"/>
+                </a:ext>
+              </a:extLst>
+            </p:cNvPr>
+            <p:cNvCxnSpPr>
+              <a:stCxn id="35" idx="6"/>
+              <a:endCxn id="70" idx="2"/>
+            </p:cNvCxnSpPr>
+            <p:nvPr/>
+          </p:nvCxnSpPr>
+          <p:spPr>
+            <a:xfrm>
+              <a:off x="10359914" y="3548362"/>
+              <a:ext cx="1377720" cy="403119"/>
+            </a:xfrm>
+            <a:prstGeom prst="straightConnector1">
+              <a:avLst/>
+            </a:prstGeom>
+            <a:ln>
+              <a:tailEnd type="triangle"/>
+            </a:ln>
+          </p:spPr>
+          <p:style>
+            <a:lnRef idx="3">
+              <a:schemeClr val="dk1"/>
+            </a:lnRef>
+            <a:fillRef idx="0">
+              <a:schemeClr val="dk1"/>
+            </a:fillRef>
+            <a:effectRef idx="2">
+              <a:schemeClr val="dk1"/>
+            </a:effectRef>
+            <a:fontRef idx="minor">
+              <a:schemeClr val="tx1"/>
+            </a:fontRef>
+          </p:style>
+        </p:cxnSp>
+        <p:cxnSp>
+          <p:nvCxnSpPr>
+            <p:cNvPr id="90" name="直线箭头连接符 89">
+              <a:extLst>
+                <a:ext uri="{FF2B5EF4-FFF2-40B4-BE49-F238E27FC236}">
+                  <a16:creationId xmlns:a16="http://schemas.microsoft.com/office/drawing/2014/main" id="{8E7141B1-C6B1-E64A-8744-89067CF50858}"/>
+                </a:ext>
+              </a:extLst>
+            </p:cNvPr>
+            <p:cNvCxnSpPr>
+              <a:cxnSpLocks/>
+              <a:stCxn id="52" idx="6"/>
+              <a:endCxn id="70" idx="2"/>
+            </p:cNvCxnSpPr>
+            <p:nvPr/>
+          </p:nvCxnSpPr>
+          <p:spPr>
+            <a:xfrm flipV="1">
+              <a:off x="10366526" y="3951481"/>
+              <a:ext cx="1371108" cy="430228"/>
+            </a:xfrm>
+            <a:prstGeom prst="straightConnector1">
+              <a:avLst/>
+            </a:prstGeom>
+            <a:ln>
+              <a:tailEnd type="triangle"/>
+            </a:ln>
+          </p:spPr>
+          <p:style>
+            <a:lnRef idx="3">
+              <a:schemeClr val="dk1"/>
+            </a:lnRef>
+            <a:fillRef idx="0">
+              <a:schemeClr val="dk1"/>
+            </a:fillRef>
+            <a:effectRef idx="2">
+              <a:schemeClr val="dk1"/>
+            </a:effectRef>
+            <a:fontRef idx="minor">
+              <a:schemeClr val="tx1"/>
+            </a:fontRef>
+          </p:style>
+        </p:cxnSp>
+      </p:grpSp>
+      <p:sp>
+        <p:nvSpPr>
+          <p:cNvPr id="93" name="文本框 92">
+            <a:extLst>
+              <a:ext uri="{FF2B5EF4-FFF2-40B4-BE49-F238E27FC236}">
+                <a16:creationId xmlns:a16="http://schemas.microsoft.com/office/drawing/2014/main" id="{8CDBC156-3404-D54A-82A6-F9D6AA1E1BAF}"/>
+              </a:ext>
+            </a:extLst>
+          </p:cNvPr>
+          <p:cNvSpPr txBox="1"/>
+          <p:nvPr/>
+        </p:nvSpPr>
+        <p:spPr>
+          <a:xfrm>
+            <a:off x="2382131" y="4799128"/>
+            <a:ext cx="8176149" cy="369332"/>
+          </a:xfrm>
+          <a:prstGeom prst="rect">
+            <a:avLst/>
+          </a:prstGeom>
+          <a:noFill/>
+        </p:spPr>
+        <p:txBody>
+          <a:bodyPr wrap="none" rtlCol="0">
+            <a:spAutoFit/>
+          </a:bodyPr>
+          <a:lstStyle/>
+          <a:p>
+            <a:r>
+              <a:rPr kumimoji="1" lang="en-US" altLang="zh-CN" u="sng" dirty="0"/>
+              <a:t>Query Type (LISP-like grammar)</a:t>
+            </a:r>
+            <a:r>
+              <a:rPr kumimoji="1" lang="en-US" altLang="zh-CN" dirty="0"/>
+              <a:t>: </a:t>
+            </a:r>
+            <a:r>
+              <a:rPr kumimoji="1" lang="en-US" altLang="zh-CN" dirty="0">
+                <a:latin typeface="Consolas" panose="020B0609020204030204" pitchFamily="49" charset="0"/>
+                <a:cs typeface="Consolas" panose="020B0609020204030204" pitchFamily="49" charset="0"/>
+              </a:rPr>
+              <a:t>(u,(p,(e)),(p,(</a:t>
+            </a:r>
+            <a:r>
+              <a:rPr kumimoji="1" lang="en-US" altLang="zh-CN" dirty="0" err="1">
+                <a:latin typeface="Consolas" panose="020B0609020204030204" pitchFamily="49" charset="0"/>
+                <a:cs typeface="Consolas" panose="020B0609020204030204" pitchFamily="49" charset="0"/>
+              </a:rPr>
+              <a:t>i</a:t>
+            </a:r>
+            <a:r>
+              <a:rPr kumimoji="1" lang="en-US" altLang="zh-CN" dirty="0">
+                <a:latin typeface="Consolas" panose="020B0609020204030204" pitchFamily="49" charset="0"/>
+                <a:cs typeface="Consolas" panose="020B0609020204030204" pitchFamily="49" charset="0"/>
+              </a:rPr>
+              <a:t>,(p,(e)),(n,(p,(e))))))</a:t>
+            </a:r>
+            <a:endParaRPr kumimoji="1" lang="zh-CN" altLang="en-US" dirty="0">
+              <a:latin typeface="Consolas" panose="020B0609020204030204" pitchFamily="49" charset="0"/>
+              <a:cs typeface="Consolas" panose="020B0609020204030204" pitchFamily="49" charset="0"/>
+            </a:endParaRPr>
+          </a:p>
+        </p:txBody>
+      </p:sp>
+      <p:sp>
+        <p:nvSpPr>
+          <p:cNvPr id="95" name="椭圆 94">
+            <a:extLst>
+              <a:ext uri="{FF2B5EF4-FFF2-40B4-BE49-F238E27FC236}">
+                <a16:creationId xmlns:a16="http://schemas.microsoft.com/office/drawing/2014/main" id="{A759C6F1-E14E-A04F-BCC3-C064E4AB0164}"/>
+              </a:ext>
+            </a:extLst>
+          </p:cNvPr>
+          <p:cNvSpPr/>
+          <p:nvPr/>
+        </p:nvSpPr>
+        <p:spPr>
+          <a:xfrm>
+            <a:off x="13092810" y="3494385"/>
+            <a:ext cx="360000" cy="360000"/>
+          </a:xfrm>
+          <a:prstGeom prst="ellipse">
+            <a:avLst/>
+          </a:prstGeom>
+        </p:spPr>
+        <p:style>
+          <a:lnRef idx="1">
+            <a:schemeClr val="accent4"/>
+          </a:lnRef>
+          <a:fillRef idx="2">
+            <a:schemeClr val="accent4"/>
+          </a:fillRef>
+          <a:effectRef idx="1">
+            <a:schemeClr val="accent4"/>
+          </a:effectRef>
+          <a:fontRef idx="minor">
+            <a:schemeClr val="dk1"/>
+          </a:fontRef>
+        </p:style>
+        <p:txBody>
+          <a:bodyPr rtlCol="0" anchor="ctr"/>
+          <a:lstStyle/>
+          <a:p>
+            <a:pPr algn="ctr"/>
+            <a:r>
+              <a:rPr kumimoji="1" lang="en-US" altLang="zh-CN" dirty="0" err="1">
+                <a:latin typeface="Consolas" panose="020B0609020204030204" pitchFamily="49" charset="0"/>
+                <a:cs typeface="Consolas" panose="020B0609020204030204" pitchFamily="49" charset="0"/>
+              </a:rPr>
+              <a:t>i</a:t>
+            </a:r>
+            <a:endParaRPr kumimoji="1" lang="zh-CN" altLang="en-US" dirty="0">
+              <a:latin typeface="Consolas" panose="020B0609020204030204" pitchFamily="49" charset="0"/>
+              <a:cs typeface="Consolas" panose="020B0609020204030204" pitchFamily="49" charset="0"/>
+            </a:endParaRPr>
+          </a:p>
+        </p:txBody>
+      </p:sp>
+      <p:sp>
+        <p:nvSpPr>
+          <p:cNvPr id="96" name="椭圆 95">
+            <a:extLst>
+              <a:ext uri="{FF2B5EF4-FFF2-40B4-BE49-F238E27FC236}">
+                <a16:creationId xmlns:a16="http://schemas.microsoft.com/office/drawing/2014/main" id="{689A4D21-1FF9-6C49-8119-67846838A718}"/>
+              </a:ext>
+            </a:extLst>
+          </p:cNvPr>
+          <p:cNvSpPr/>
+          <p:nvPr/>
+        </p:nvSpPr>
+        <p:spPr>
+          <a:xfrm>
+            <a:off x="13571076" y="3494385"/>
+            <a:ext cx="360000" cy="360000"/>
+          </a:xfrm>
+          <a:prstGeom prst="ellipse">
+            <a:avLst/>
+          </a:prstGeom>
+        </p:spPr>
+        <p:style>
+          <a:lnRef idx="1">
+            <a:schemeClr val="accent2"/>
+          </a:lnRef>
+          <a:fillRef idx="2">
+            <a:schemeClr val="accent2"/>
+          </a:fillRef>
+          <a:effectRef idx="1">
+            <a:schemeClr val="accent2"/>
+          </a:effectRef>
+          <a:fontRef idx="minor">
+            <a:schemeClr val="dk1"/>
+          </a:fontRef>
+        </p:style>
+        <p:txBody>
+          <a:bodyPr rtlCol="0" anchor="ctr"/>
+          <a:lstStyle/>
+          <a:p>
+            <a:pPr algn="ctr"/>
+            <a:r>
+              <a:rPr kumimoji="1" lang="en-US" altLang="zh-CN" dirty="0">
+                <a:latin typeface="Consolas" panose="020B0609020204030204" pitchFamily="49" charset="0"/>
+                <a:cs typeface="Consolas" panose="020B0609020204030204" pitchFamily="49" charset="0"/>
+              </a:rPr>
+              <a:t>n</a:t>
+            </a:r>
+            <a:endParaRPr kumimoji="1" lang="zh-CN" altLang="en-US" dirty="0">
+              <a:latin typeface="Consolas" panose="020B0609020204030204" pitchFamily="49" charset="0"/>
+              <a:cs typeface="Consolas" panose="020B0609020204030204" pitchFamily="49" charset="0"/>
+            </a:endParaRPr>
+          </a:p>
+        </p:txBody>
+      </p:sp>
+      <p:sp>
+        <p:nvSpPr>
+          <p:cNvPr id="97" name="椭圆 96">
+            <a:extLst>
+              <a:ext uri="{FF2B5EF4-FFF2-40B4-BE49-F238E27FC236}">
+                <a16:creationId xmlns:a16="http://schemas.microsoft.com/office/drawing/2014/main" id="{1CD55431-E518-4344-AE04-9FB4F9625347}"/>
+              </a:ext>
+            </a:extLst>
+          </p:cNvPr>
+          <p:cNvSpPr/>
+          <p:nvPr/>
+        </p:nvSpPr>
+        <p:spPr>
+          <a:xfrm>
+            <a:off x="14049342" y="3494385"/>
+            <a:ext cx="360000" cy="360000"/>
+          </a:xfrm>
+          <a:prstGeom prst="ellipse">
+            <a:avLst/>
+          </a:prstGeom>
+        </p:spPr>
+        <p:style>
+          <a:lnRef idx="1">
+            <a:schemeClr val="accent6"/>
+          </a:lnRef>
+          <a:fillRef idx="2">
+            <a:schemeClr val="accent6"/>
+          </a:fillRef>
+          <a:effectRef idx="1">
+            <a:schemeClr val="accent6"/>
+          </a:effectRef>
+          <a:fontRef idx="minor">
+            <a:schemeClr val="dk1"/>
+          </a:fontRef>
+        </p:style>
+        <p:txBody>
+          <a:bodyPr rtlCol="0" anchor="ctr"/>
+          <a:lstStyle/>
+          <a:p>
+            <a:pPr algn="ctr"/>
+            <a:r>
+              <a:rPr kumimoji="1" lang="en-US" altLang="zh-CN" dirty="0">
+                <a:latin typeface="Consolas" panose="020B0609020204030204" pitchFamily="49" charset="0"/>
+                <a:cs typeface="Consolas" panose="020B0609020204030204" pitchFamily="49" charset="0"/>
+              </a:rPr>
+              <a:t>u</a:t>
+            </a:r>
+            <a:endParaRPr kumimoji="1" lang="zh-CN" altLang="en-US" dirty="0">
+              <a:latin typeface="Consolas" panose="020B0609020204030204" pitchFamily="49" charset="0"/>
+              <a:cs typeface="Consolas" panose="020B0609020204030204" pitchFamily="49" charset="0"/>
+            </a:endParaRPr>
+          </a:p>
+        </p:txBody>
+      </p:sp>
+      <p:sp>
+        <p:nvSpPr>
+          <p:cNvPr id="98" name="椭圆 97">
+            <a:extLst>
+              <a:ext uri="{FF2B5EF4-FFF2-40B4-BE49-F238E27FC236}">
+                <a16:creationId xmlns:a16="http://schemas.microsoft.com/office/drawing/2014/main" id="{C88E1AA0-C80F-7B46-B228-908A5753DF65}"/>
+              </a:ext>
+            </a:extLst>
+          </p:cNvPr>
+          <p:cNvSpPr/>
+          <p:nvPr/>
+        </p:nvSpPr>
+        <p:spPr>
+          <a:xfrm>
+            <a:off x="15005874" y="3494385"/>
+            <a:ext cx="360000" cy="360000"/>
+          </a:xfrm>
+          <a:prstGeom prst="ellipse">
+            <a:avLst/>
+          </a:prstGeom>
+        </p:spPr>
+        <p:style>
+          <a:lnRef idx="1">
+            <a:schemeClr val="accent5"/>
+          </a:lnRef>
+          <a:fillRef idx="2">
+            <a:schemeClr val="accent5"/>
+          </a:fillRef>
+          <a:effectRef idx="1">
+            <a:schemeClr val="accent5"/>
+          </a:effectRef>
+          <a:fontRef idx="minor">
+            <a:schemeClr val="dk1"/>
+          </a:fontRef>
+        </p:style>
+        <p:txBody>
+          <a:bodyPr rtlCol="0" anchor="ctr"/>
+          <a:lstStyle/>
+          <a:p>
+            <a:pPr algn="ctr"/>
+            <a:r>
+              <a:rPr kumimoji="1" lang="en-US" altLang="zh-CN" dirty="0">
+                <a:latin typeface="Consolas" panose="020B0609020204030204" pitchFamily="49" charset="0"/>
+                <a:cs typeface="Consolas" panose="020B0609020204030204" pitchFamily="49" charset="0"/>
+              </a:rPr>
+              <a:t>e</a:t>
+            </a:r>
+            <a:endParaRPr kumimoji="1" lang="zh-CN" altLang="en-US" dirty="0">
+              <a:latin typeface="Consolas" panose="020B0609020204030204" pitchFamily="49" charset="0"/>
+              <a:cs typeface="Consolas" panose="020B0609020204030204" pitchFamily="49" charset="0"/>
+            </a:endParaRPr>
+          </a:p>
+        </p:txBody>
+      </p:sp>
+      <p:sp>
+        <p:nvSpPr>
+          <p:cNvPr id="99" name="椭圆 98">
+            <a:extLst>
+              <a:ext uri="{FF2B5EF4-FFF2-40B4-BE49-F238E27FC236}">
+                <a16:creationId xmlns:a16="http://schemas.microsoft.com/office/drawing/2014/main" id="{F1412CC7-79D7-0F49-A1D4-13A5A5A5A492}"/>
+              </a:ext>
+            </a:extLst>
+          </p:cNvPr>
+          <p:cNvSpPr/>
+          <p:nvPr/>
+        </p:nvSpPr>
+        <p:spPr>
+          <a:xfrm>
+            <a:off x="14527608" y="3494385"/>
+            <a:ext cx="360000" cy="360000"/>
+          </a:xfrm>
+          <a:prstGeom prst="ellipse">
+            <a:avLst/>
+          </a:prstGeom>
+        </p:spPr>
+        <p:style>
+          <a:lnRef idx="1">
+            <a:schemeClr val="accent3"/>
+          </a:lnRef>
+          <a:fillRef idx="2">
+            <a:schemeClr val="accent3"/>
+          </a:fillRef>
+          <a:effectRef idx="1">
+            <a:schemeClr val="accent3"/>
+          </a:effectRef>
+          <a:fontRef idx="minor">
+            <a:schemeClr val="dk1"/>
+          </a:fontRef>
+        </p:style>
+        <p:txBody>
+          <a:bodyPr rtlCol="0" anchor="ctr"/>
+          <a:lstStyle/>
+          <a:p>
+            <a:pPr algn="ctr"/>
+            <a:r>
+              <a:rPr kumimoji="1" lang="en-US" altLang="zh-CN" dirty="0">
+                <a:latin typeface="Consolas" panose="020B0609020204030204" pitchFamily="49" charset="0"/>
+                <a:cs typeface="Consolas" panose="020B0609020204030204" pitchFamily="49" charset="0"/>
+              </a:rPr>
+              <a:t>p</a:t>
+            </a:r>
+            <a:endParaRPr kumimoji="1" lang="zh-CN" altLang="en-US" dirty="0">
+              <a:latin typeface="Consolas" panose="020B0609020204030204" pitchFamily="49" charset="0"/>
+              <a:cs typeface="Consolas" panose="020B0609020204030204" pitchFamily="49" charset="0"/>
+            </a:endParaRPr>
+          </a:p>
+        </p:txBody>
+      </p:sp>
+      <p:sp>
+        <p:nvSpPr>
+          <p:cNvPr id="100" name="文本框 99">
+            <a:extLst>
+              <a:ext uri="{FF2B5EF4-FFF2-40B4-BE49-F238E27FC236}">
+                <a16:creationId xmlns:a16="http://schemas.microsoft.com/office/drawing/2014/main" id="{0C75F75F-E2FD-3A41-B7F9-657760EF0C40}"/>
+              </a:ext>
+            </a:extLst>
+          </p:cNvPr>
+          <p:cNvSpPr txBox="1"/>
+          <p:nvPr/>
+        </p:nvSpPr>
+        <p:spPr>
+          <a:xfrm>
+            <a:off x="13571076" y="2901934"/>
+            <a:ext cx="1120563" cy="369332"/>
+          </a:xfrm>
+          <a:prstGeom prst="rect">
+            <a:avLst/>
+          </a:prstGeom>
+          <a:noFill/>
+        </p:spPr>
+        <p:txBody>
+          <a:bodyPr wrap="none" rtlCol="0">
+            <a:spAutoFit/>
+          </a:bodyPr>
+          <a:lstStyle/>
+          <a:p>
+            <a:r>
+              <a:rPr kumimoji="1" lang="en-US" altLang="zh-CN" dirty="0"/>
+              <a:t>Operators</a:t>
+            </a:r>
+            <a:endParaRPr kumimoji="1" lang="zh-CN" altLang="en-US" dirty="0"/>
+          </a:p>
+        </p:txBody>
+      </p:sp>
+    </p:spTree>
+    <p:extLst>
+      <p:ext uri="{BB962C8B-B14F-4D97-AF65-F5344CB8AC3E}">
+        <p14:creationId xmlns:p14="http://schemas.microsoft.com/office/powerpoint/2010/main" val="3259795214"/>
+      </p:ext>
+    </p:extLst>
+  </p:cSld>
+  <p:clrMapOvr>
+    <a:masterClrMapping/>
+  </p:clrMapOvr>
+</p:sld>
+</file>
+
 <file path=ppt/theme/theme1.xml><?xml version="1.0" encoding="utf-8"?>
 <a:theme xmlns:a="http://schemas.openxmlformats.org/drawingml/2006/main" name="Office 主题​​">
   <a:themeElements>

</xml_diff>